<commit_message>
last minute corrections to not so sql
</commit_message>
<xml_diff>
--- a/not-so-sql/Not So SQL Anymore v1.pptx
+++ b/not-so-sql/Not So SQL Anymore v1.pptx
@@ -119,6 +119,11 @@
       </a:defRPr>
     </a:lvl9pPr>
   </p:defaultTextStyle>
+  <p:extLst>
+    <p:ext uri="{EFAFB233-063F-42B5-8137-9DF3F51BA10A}">
+      <p15:sldGuideLst xmlns:p15="http://schemas.microsoft.com/office/powerpoint/2012/main"/>
+    </p:ext>
+  </p:extLst>
 </p:presentation>
 </file>
 
@@ -179,7 +184,7 @@
           <a:noFill/>
           <a:extLst>
             <a:ext uri="{909E8E84-426E-40dd-AFC4-6F175D3DCCD1}">
-              <a14:hiddenFill xmlns:a14="http://schemas.microsoft.com/office/drawing/2010/main" xmlns="">
+              <a14:hiddenFill xmlns="" xmlns:a14="http://schemas.microsoft.com/office/drawing/2010/main">
                 <a:solidFill>
                   <a:srgbClr val="FFFFFF"/>
                 </a:solidFill>
@@ -238,7 +243,7 @@
             </a:ln>
             <a:extLst>
               <a:ext uri="{91240B29-F687-4f45-9708-019B960494DF}">
-                <a14:hiddenLine xmlns:a14="http://schemas.microsoft.com/office/drawing/2010/main" xmlns="" w="9525">
+                <a14:hiddenLine xmlns="" xmlns:a14="http://schemas.microsoft.com/office/drawing/2010/main" w="9525">
                   <a:solidFill>
                     <a:srgbClr val="000000"/>
                   </a:solidFill>
@@ -328,7 +333,7 @@
             </a:ln>
             <a:extLst>
               <a:ext uri="{91240B29-F687-4f45-9708-019B960494DF}">
-                <a14:hiddenLine xmlns:a14="http://schemas.microsoft.com/office/drawing/2010/main" xmlns="" w="9525">
+                <a14:hiddenLine xmlns="" xmlns:a14="http://schemas.microsoft.com/office/drawing/2010/main" w="9525">
                   <a:solidFill>
                     <a:srgbClr val="000000"/>
                   </a:solidFill>
@@ -418,7 +423,7 @@
             </a:ln>
             <a:extLst>
               <a:ext uri="{91240B29-F687-4f45-9708-019B960494DF}">
-                <a14:hiddenLine xmlns:a14="http://schemas.microsoft.com/office/drawing/2010/main" xmlns="" w="9525">
+                <a14:hiddenLine xmlns="" xmlns:a14="http://schemas.microsoft.com/office/drawing/2010/main" w="9525">
                   <a:solidFill>
                     <a:srgbClr val="000000"/>
                   </a:solidFill>
@@ -452,7 +457,7 @@
             </a:ln>
             <a:extLst>
               <a:ext uri="{91240B29-F687-4f45-9708-019B960494DF}">
-                <a14:hiddenLine xmlns:a14="http://schemas.microsoft.com/office/drawing/2010/main" xmlns="" w="9525">
+                <a14:hiddenLine xmlns="" xmlns:a14="http://schemas.microsoft.com/office/drawing/2010/main" w="9525">
                   <a:solidFill>
                     <a:srgbClr val="000000"/>
                   </a:solidFill>
@@ -542,7 +547,7 @@
             </a:ln>
             <a:extLst>
               <a:ext uri="{91240B29-F687-4f45-9708-019B960494DF}">
-                <a14:hiddenLine xmlns:a14="http://schemas.microsoft.com/office/drawing/2010/main" xmlns="" w="9525">
+                <a14:hiddenLine xmlns="" xmlns:a14="http://schemas.microsoft.com/office/drawing/2010/main" w="9525">
                   <a:solidFill>
                     <a:srgbClr val="000000"/>
                   </a:solidFill>
@@ -604,7 +609,7 @@
             </a:ln>
             <a:extLst>
               <a:ext uri="{91240B29-F687-4f45-9708-019B960494DF}">
-                <a14:hiddenLine xmlns:a14="http://schemas.microsoft.com/office/drawing/2010/main" xmlns="" w="9525">
+                <a14:hiddenLine xmlns="" xmlns:a14="http://schemas.microsoft.com/office/drawing/2010/main" w="9525">
                   <a:solidFill>
                     <a:srgbClr val="000000"/>
                   </a:solidFill>
@@ -666,7 +671,7 @@
             </a:ln>
             <a:extLst>
               <a:ext uri="{91240B29-F687-4f45-9708-019B960494DF}">
-                <a14:hiddenLine xmlns:a14="http://schemas.microsoft.com/office/drawing/2010/main" xmlns="" w="9525">
+                <a14:hiddenLine xmlns="" xmlns:a14="http://schemas.microsoft.com/office/drawing/2010/main" w="9525">
                   <a:solidFill>
                     <a:srgbClr val="000000"/>
                   </a:solidFill>
@@ -756,7 +761,7 @@
             </a:ln>
             <a:extLst>
               <a:ext uri="{91240B29-F687-4f45-9708-019B960494DF}">
-                <a14:hiddenLine xmlns:a14="http://schemas.microsoft.com/office/drawing/2010/main" xmlns="" w="9525">
+                <a14:hiddenLine xmlns="" xmlns:a14="http://schemas.microsoft.com/office/drawing/2010/main" w="9525">
                   <a:solidFill>
                     <a:srgbClr val="000000"/>
                   </a:solidFill>
@@ -818,7 +823,7 @@
             </a:ln>
             <a:extLst>
               <a:ext uri="{91240B29-F687-4f45-9708-019B960494DF}">
-                <a14:hiddenLine xmlns:a14="http://schemas.microsoft.com/office/drawing/2010/main" xmlns="" w="9525">
+                <a14:hiddenLine xmlns="" xmlns:a14="http://schemas.microsoft.com/office/drawing/2010/main" w="9525">
                   <a:solidFill>
                     <a:srgbClr val="000000"/>
                   </a:solidFill>
@@ -880,7 +885,7 @@
             </a:ln>
             <a:extLst>
               <a:ext uri="{91240B29-F687-4f45-9708-019B960494DF}">
-                <a14:hiddenLine xmlns:a14="http://schemas.microsoft.com/office/drawing/2010/main" xmlns="" w="9525">
+                <a14:hiddenLine xmlns="" xmlns:a14="http://schemas.microsoft.com/office/drawing/2010/main" w="9525">
                   <a:solidFill>
                     <a:srgbClr val="000000"/>
                   </a:solidFill>
@@ -970,7 +975,7 @@
             </a:ln>
             <a:extLst>
               <a:ext uri="{91240B29-F687-4f45-9708-019B960494DF}">
-                <a14:hiddenLine xmlns:a14="http://schemas.microsoft.com/office/drawing/2010/main" xmlns="" w="9525">
+                <a14:hiddenLine xmlns="" xmlns:a14="http://schemas.microsoft.com/office/drawing/2010/main" w="9525">
                   <a:solidFill>
                     <a:srgbClr val="000000"/>
                   </a:solidFill>
@@ -1060,7 +1065,7 @@
             </a:ln>
             <a:extLst>
               <a:ext uri="{91240B29-F687-4f45-9708-019B960494DF}">
-                <a14:hiddenLine xmlns:a14="http://schemas.microsoft.com/office/drawing/2010/main" xmlns="" w="9525">
+                <a14:hiddenLine xmlns="" xmlns:a14="http://schemas.microsoft.com/office/drawing/2010/main" w="9525">
                   <a:solidFill>
                     <a:srgbClr val="000000"/>
                   </a:solidFill>
@@ -1122,7 +1127,7 @@
             </a:ln>
             <a:extLst>
               <a:ext uri="{91240B29-F687-4f45-9708-019B960494DF}">
-                <a14:hiddenLine xmlns:a14="http://schemas.microsoft.com/office/drawing/2010/main" xmlns="" w="9525">
+                <a14:hiddenLine xmlns="" xmlns:a14="http://schemas.microsoft.com/office/drawing/2010/main" w="9525">
                   <a:solidFill>
                     <a:srgbClr val="000000"/>
                   </a:solidFill>
@@ -1232,7 +1237,7 @@
             </a:ln>
             <a:extLst>
               <a:ext uri="{91240B29-F687-4f45-9708-019B960494DF}">
-                <a14:hiddenLine xmlns:a14="http://schemas.microsoft.com/office/drawing/2010/main" xmlns="" w="9525">
+                <a14:hiddenLine xmlns="" xmlns:a14="http://schemas.microsoft.com/office/drawing/2010/main" w="9525">
                   <a:solidFill>
                     <a:srgbClr val="000000"/>
                   </a:solidFill>
@@ -1294,7 +1299,7 @@
             </a:ln>
             <a:extLst>
               <a:ext uri="{91240B29-F687-4f45-9708-019B960494DF}">
-                <a14:hiddenLine xmlns:a14="http://schemas.microsoft.com/office/drawing/2010/main" xmlns="" w="9525">
+                <a14:hiddenLine xmlns="" xmlns:a14="http://schemas.microsoft.com/office/drawing/2010/main" w="9525">
                   <a:solidFill>
                     <a:srgbClr val="000000"/>
                   </a:solidFill>
@@ -1384,7 +1389,7 @@
             </a:ln>
             <a:extLst>
               <a:ext uri="{91240B29-F687-4f45-9708-019B960494DF}">
-                <a14:hiddenLine xmlns:a14="http://schemas.microsoft.com/office/drawing/2010/main" xmlns="" w="9525">
+                <a14:hiddenLine xmlns="" xmlns:a14="http://schemas.microsoft.com/office/drawing/2010/main" w="9525">
                   <a:solidFill>
                     <a:srgbClr val="000000"/>
                   </a:solidFill>
@@ -1474,7 +1479,7 @@
             </a:ln>
             <a:extLst>
               <a:ext uri="{91240B29-F687-4f45-9708-019B960494DF}">
-                <a14:hiddenLine xmlns:a14="http://schemas.microsoft.com/office/drawing/2010/main" xmlns="" w="9525">
+                <a14:hiddenLine xmlns="" xmlns:a14="http://schemas.microsoft.com/office/drawing/2010/main" w="9525">
                   <a:solidFill>
                     <a:srgbClr val="000000"/>
                   </a:solidFill>
@@ -1536,7 +1541,7 @@
             </a:ln>
             <a:extLst>
               <a:ext uri="{91240B29-F687-4f45-9708-019B960494DF}">
-                <a14:hiddenLine xmlns:a14="http://schemas.microsoft.com/office/drawing/2010/main" xmlns="" w="9525">
+                <a14:hiddenLine xmlns="" xmlns:a14="http://schemas.microsoft.com/office/drawing/2010/main" w="9525">
                   <a:solidFill>
                     <a:srgbClr val="000000"/>
                   </a:solidFill>
@@ -1626,7 +1631,7 @@
             </a:ln>
             <a:extLst>
               <a:ext uri="{91240B29-F687-4f45-9708-019B960494DF}">
-                <a14:hiddenLine xmlns:a14="http://schemas.microsoft.com/office/drawing/2010/main" xmlns="" w="9525">
+                <a14:hiddenLine xmlns="" xmlns:a14="http://schemas.microsoft.com/office/drawing/2010/main" w="9525">
                   <a:solidFill>
                     <a:srgbClr val="000000"/>
                   </a:solidFill>
@@ -1716,7 +1721,7 @@
             </a:ln>
             <a:extLst>
               <a:ext uri="{91240B29-F687-4f45-9708-019B960494DF}">
-                <a14:hiddenLine xmlns:a14="http://schemas.microsoft.com/office/drawing/2010/main" xmlns="" w="9525">
+                <a14:hiddenLine xmlns="" xmlns:a14="http://schemas.microsoft.com/office/drawing/2010/main" w="9525">
                   <a:solidFill>
                     <a:srgbClr val="000000"/>
                   </a:solidFill>
@@ -1772,7 +1777,7 @@
             </a:ln>
             <a:extLst>
               <a:ext uri="{91240B29-F687-4f45-9708-019B960494DF}">
-                <a14:hiddenLine xmlns:a14="http://schemas.microsoft.com/office/drawing/2010/main" xmlns="" w="9525">
+                <a14:hiddenLine xmlns="" xmlns:a14="http://schemas.microsoft.com/office/drawing/2010/main" w="9525">
                   <a:solidFill>
                     <a:srgbClr val="000000"/>
                   </a:solidFill>
@@ -1862,7 +1867,7 @@
             </a:ln>
             <a:extLst>
               <a:ext uri="{91240B29-F687-4f45-9708-019B960494DF}">
-                <a14:hiddenLine xmlns:a14="http://schemas.microsoft.com/office/drawing/2010/main" xmlns="" w="9525">
+                <a14:hiddenLine xmlns="" xmlns:a14="http://schemas.microsoft.com/office/drawing/2010/main" w="9525">
                   <a:solidFill>
                     <a:srgbClr val="000000"/>
                   </a:solidFill>
@@ -1918,7 +1923,7 @@
             </a:ln>
             <a:extLst>
               <a:ext uri="{91240B29-F687-4f45-9708-019B960494DF}">
-                <a14:hiddenLine xmlns:a14="http://schemas.microsoft.com/office/drawing/2010/main" xmlns="" w="9525">
+                <a14:hiddenLine xmlns="" xmlns:a14="http://schemas.microsoft.com/office/drawing/2010/main" w="9525">
                   <a:solidFill>
                     <a:srgbClr val="000000"/>
                   </a:solidFill>
@@ -2008,7 +2013,7 @@
             </a:ln>
             <a:extLst>
               <a:ext uri="{91240B29-F687-4f45-9708-019B960494DF}">
-                <a14:hiddenLine xmlns:a14="http://schemas.microsoft.com/office/drawing/2010/main" xmlns="" w="9525">
+                <a14:hiddenLine xmlns="" xmlns:a14="http://schemas.microsoft.com/office/drawing/2010/main" w="9525">
                   <a:solidFill>
                     <a:srgbClr val="000000"/>
                   </a:solidFill>
@@ -2076,7 +2081,7 @@
             </a:ln>
             <a:extLst>
               <a:ext uri="{91240B29-F687-4f45-9708-019B960494DF}">
-                <a14:hiddenLine xmlns:a14="http://schemas.microsoft.com/office/drawing/2010/main" xmlns="" w="9525">
+                <a14:hiddenLine xmlns="" xmlns:a14="http://schemas.microsoft.com/office/drawing/2010/main" w="9525">
                   <a:solidFill>
                     <a:srgbClr val="000000"/>
                   </a:solidFill>
@@ -2166,7 +2171,7 @@
             </a:ln>
             <a:extLst>
               <a:ext uri="{91240B29-F687-4f45-9708-019B960494DF}">
-                <a14:hiddenLine xmlns:a14="http://schemas.microsoft.com/office/drawing/2010/main" xmlns="" w="9525">
+                <a14:hiddenLine xmlns="" xmlns:a14="http://schemas.microsoft.com/office/drawing/2010/main" w="9525">
                   <a:solidFill>
                     <a:srgbClr val="000000"/>
                   </a:solidFill>
@@ -2234,7 +2239,7 @@
             </a:ln>
             <a:extLst>
               <a:ext uri="{91240B29-F687-4f45-9708-019B960494DF}">
-                <a14:hiddenLine xmlns:a14="http://schemas.microsoft.com/office/drawing/2010/main" xmlns="" w="9525">
+                <a14:hiddenLine xmlns="" xmlns:a14="http://schemas.microsoft.com/office/drawing/2010/main" w="9525">
                   <a:solidFill>
                     <a:srgbClr val="000000"/>
                   </a:solidFill>
@@ -2324,7 +2329,7 @@
             </a:ln>
             <a:extLst>
               <a:ext uri="{91240B29-F687-4f45-9708-019B960494DF}">
-                <a14:hiddenLine xmlns:a14="http://schemas.microsoft.com/office/drawing/2010/main" xmlns="" w="9525">
+                <a14:hiddenLine xmlns="" xmlns:a14="http://schemas.microsoft.com/office/drawing/2010/main" w="9525">
                   <a:solidFill>
                     <a:srgbClr val="000000"/>
                   </a:solidFill>
@@ -2358,7 +2363,7 @@
             </a:ln>
             <a:extLst>
               <a:ext uri="{91240B29-F687-4f45-9708-019B960494DF}">
-                <a14:hiddenLine xmlns:a14="http://schemas.microsoft.com/office/drawing/2010/main" xmlns="" w="9525">
+                <a14:hiddenLine xmlns="" xmlns:a14="http://schemas.microsoft.com/office/drawing/2010/main" w="9525">
                   <a:solidFill>
                     <a:srgbClr val="000000"/>
                   </a:solidFill>
@@ -2448,7 +2453,7 @@
             </a:ln>
             <a:extLst>
               <a:ext uri="{91240B29-F687-4f45-9708-019B960494DF}">
-                <a14:hiddenLine xmlns:a14="http://schemas.microsoft.com/office/drawing/2010/main" xmlns="" w="9525">
+                <a14:hiddenLine xmlns="" xmlns:a14="http://schemas.microsoft.com/office/drawing/2010/main" w="9525">
                   <a:solidFill>
                     <a:srgbClr val="000000"/>
                   </a:solidFill>
@@ -2510,7 +2515,7 @@
             </a:ln>
             <a:extLst>
               <a:ext uri="{91240B29-F687-4f45-9708-019B960494DF}">
-                <a14:hiddenLine xmlns:a14="http://schemas.microsoft.com/office/drawing/2010/main" xmlns="" w="9525">
+                <a14:hiddenLine xmlns="" xmlns:a14="http://schemas.microsoft.com/office/drawing/2010/main" w="9525">
                   <a:solidFill>
                     <a:srgbClr val="000000"/>
                   </a:solidFill>
@@ -2572,7 +2577,7 @@
             </a:ln>
             <a:extLst>
               <a:ext uri="{91240B29-F687-4f45-9708-019B960494DF}">
-                <a14:hiddenLine xmlns:a14="http://schemas.microsoft.com/office/drawing/2010/main" xmlns="" w="9525">
+                <a14:hiddenLine xmlns="" xmlns:a14="http://schemas.microsoft.com/office/drawing/2010/main" w="9525">
                   <a:solidFill>
                     <a:srgbClr val="000000"/>
                   </a:solidFill>
@@ -2662,7 +2667,7 @@
             </a:ln>
             <a:extLst>
               <a:ext uri="{91240B29-F687-4f45-9708-019B960494DF}">
-                <a14:hiddenLine xmlns:a14="http://schemas.microsoft.com/office/drawing/2010/main" xmlns="" w="9525">
+                <a14:hiddenLine xmlns="" xmlns:a14="http://schemas.microsoft.com/office/drawing/2010/main" w="9525">
                   <a:solidFill>
                     <a:srgbClr val="000000"/>
                   </a:solidFill>
@@ -2730,7 +2735,7 @@
             </a:ln>
             <a:extLst>
               <a:ext uri="{91240B29-F687-4f45-9708-019B960494DF}">
-                <a14:hiddenLine xmlns:a14="http://schemas.microsoft.com/office/drawing/2010/main" xmlns="" w="9525">
+                <a14:hiddenLine xmlns="" xmlns:a14="http://schemas.microsoft.com/office/drawing/2010/main" w="9525">
                   <a:solidFill>
                     <a:srgbClr val="000000"/>
                   </a:solidFill>
@@ -2792,7 +2797,7 @@
             </a:ln>
             <a:extLst>
               <a:ext uri="{91240B29-F687-4f45-9708-019B960494DF}">
-                <a14:hiddenLine xmlns:a14="http://schemas.microsoft.com/office/drawing/2010/main" xmlns="" w="9525">
+                <a14:hiddenLine xmlns="" xmlns:a14="http://schemas.microsoft.com/office/drawing/2010/main" w="9525">
                   <a:solidFill>
                     <a:srgbClr val="000000"/>
                   </a:solidFill>
@@ -2882,7 +2887,7 @@
             </a:ln>
             <a:extLst>
               <a:ext uri="{91240B29-F687-4f45-9708-019B960494DF}">
-                <a14:hiddenLine xmlns:a14="http://schemas.microsoft.com/office/drawing/2010/main" xmlns="" w="9525">
+                <a14:hiddenLine xmlns="" xmlns:a14="http://schemas.microsoft.com/office/drawing/2010/main" w="9525">
                   <a:solidFill>
                     <a:srgbClr val="000000"/>
                   </a:solidFill>
@@ -2944,7 +2949,7 @@
             </a:ln>
             <a:extLst>
               <a:ext uri="{91240B29-F687-4f45-9708-019B960494DF}">
-                <a14:hiddenLine xmlns:a14="http://schemas.microsoft.com/office/drawing/2010/main" xmlns="" w="9525">
+                <a14:hiddenLine xmlns="" xmlns:a14="http://schemas.microsoft.com/office/drawing/2010/main" w="9525">
                   <a:solidFill>
                     <a:srgbClr val="000000"/>
                   </a:solidFill>
@@ -3034,7 +3039,7 @@
             </a:ln>
             <a:extLst>
               <a:ext uri="{91240B29-F687-4f45-9708-019B960494DF}">
-                <a14:hiddenLine xmlns:a14="http://schemas.microsoft.com/office/drawing/2010/main" xmlns="" w="9525">
+                <a14:hiddenLine xmlns="" xmlns:a14="http://schemas.microsoft.com/office/drawing/2010/main" w="9525">
                   <a:solidFill>
                     <a:srgbClr val="000000"/>
                   </a:solidFill>
@@ -3096,7 +3101,7 @@
             </a:ln>
             <a:extLst>
               <a:ext uri="{91240B29-F687-4f45-9708-019B960494DF}">
-                <a14:hiddenLine xmlns:a14="http://schemas.microsoft.com/office/drawing/2010/main" xmlns="" w="9525">
+                <a14:hiddenLine xmlns="" xmlns:a14="http://schemas.microsoft.com/office/drawing/2010/main" w="9525">
                   <a:solidFill>
                     <a:srgbClr val="000000"/>
                   </a:solidFill>
@@ -3186,7 +3191,7 @@
             </a:ln>
             <a:extLst>
               <a:ext uri="{91240B29-F687-4f45-9708-019B960494DF}">
-                <a14:hiddenLine xmlns:a14="http://schemas.microsoft.com/office/drawing/2010/main" xmlns="" w="9525">
+                <a14:hiddenLine xmlns="" xmlns:a14="http://schemas.microsoft.com/office/drawing/2010/main" w="9525">
                   <a:solidFill>
                     <a:srgbClr val="000000"/>
                   </a:solidFill>
@@ -3220,7 +3225,7 @@
             </a:ln>
             <a:extLst>
               <a:ext uri="{91240B29-F687-4f45-9708-019B960494DF}">
-                <a14:hiddenLine xmlns:a14="http://schemas.microsoft.com/office/drawing/2010/main" xmlns="" w="9525">
+                <a14:hiddenLine xmlns="" xmlns:a14="http://schemas.microsoft.com/office/drawing/2010/main" w="9525">
                   <a:solidFill>
                     <a:srgbClr val="000000"/>
                   </a:solidFill>
@@ -3285,7 +3290,7 @@
             </a:ln>
             <a:extLst>
               <a:ext uri="{91240B29-F687-4f45-9708-019B960494DF}">
-                <a14:hiddenLine xmlns:a14="http://schemas.microsoft.com/office/drawing/2010/main" xmlns="" w="9525">
+                <a14:hiddenLine xmlns="" xmlns:a14="http://schemas.microsoft.com/office/drawing/2010/main" w="9525">
                   <a:solidFill>
                     <a:srgbClr val="000000"/>
                   </a:solidFill>
@@ -3375,7 +3380,7 @@
             </a:ln>
             <a:extLst>
               <a:ext uri="{91240B29-F687-4f45-9708-019B960494DF}">
-                <a14:hiddenLine xmlns:a14="http://schemas.microsoft.com/office/drawing/2010/main" xmlns="" w="9525">
+                <a14:hiddenLine xmlns="" xmlns:a14="http://schemas.microsoft.com/office/drawing/2010/main" w="9525">
                   <a:solidFill>
                     <a:srgbClr val="000000"/>
                   </a:solidFill>
@@ -3437,7 +3442,7 @@
             </a:ln>
             <a:extLst>
               <a:ext uri="{91240B29-F687-4f45-9708-019B960494DF}">
-                <a14:hiddenLine xmlns:a14="http://schemas.microsoft.com/office/drawing/2010/main" xmlns="" w="9525">
+                <a14:hiddenLine xmlns="" xmlns:a14="http://schemas.microsoft.com/office/drawing/2010/main" w="9525">
                   <a:solidFill>
                     <a:srgbClr val="000000"/>
                   </a:solidFill>
@@ -3527,7 +3532,7 @@
             </a:ln>
             <a:extLst>
               <a:ext uri="{91240B29-F687-4f45-9708-019B960494DF}">
-                <a14:hiddenLine xmlns:a14="http://schemas.microsoft.com/office/drawing/2010/main" xmlns="" w="9525">
+                <a14:hiddenLine xmlns="" xmlns:a14="http://schemas.microsoft.com/office/drawing/2010/main" w="9525">
                   <a:solidFill>
                     <a:srgbClr val="000000"/>
                   </a:solidFill>
@@ -3617,7 +3622,7 @@
             </a:ln>
             <a:extLst>
               <a:ext uri="{91240B29-F687-4f45-9708-019B960494DF}">
-                <a14:hiddenLine xmlns:a14="http://schemas.microsoft.com/office/drawing/2010/main" xmlns="" w="9525">
+                <a14:hiddenLine xmlns="" xmlns:a14="http://schemas.microsoft.com/office/drawing/2010/main" w="9525">
                   <a:solidFill>
                     <a:srgbClr val="000000"/>
                   </a:solidFill>
@@ -3682,7 +3687,7 @@
             </a:ln>
             <a:extLst>
               <a:ext uri="{91240B29-F687-4f45-9708-019B960494DF}">
-                <a14:hiddenLine xmlns:a14="http://schemas.microsoft.com/office/drawing/2010/main" xmlns="" w="9525">
+                <a14:hiddenLine xmlns="" xmlns:a14="http://schemas.microsoft.com/office/drawing/2010/main" w="9525">
                   <a:solidFill>
                     <a:srgbClr val="000000"/>
                   </a:solidFill>
@@ -3744,7 +3749,7 @@
             </a:ln>
             <a:extLst>
               <a:ext uri="{91240B29-F687-4f45-9708-019B960494DF}">
-                <a14:hiddenLine xmlns:a14="http://schemas.microsoft.com/office/drawing/2010/main" xmlns="" w="9525">
+                <a14:hiddenLine xmlns="" xmlns:a14="http://schemas.microsoft.com/office/drawing/2010/main" w="9525">
                   <a:solidFill>
                     <a:srgbClr val="000000"/>
                   </a:solidFill>
@@ -3834,7 +3839,7 @@
             </a:ln>
             <a:extLst>
               <a:ext uri="{91240B29-F687-4f45-9708-019B960494DF}">
-                <a14:hiddenLine xmlns:a14="http://schemas.microsoft.com/office/drawing/2010/main" xmlns="" w="9525">
+                <a14:hiddenLine xmlns="" xmlns:a14="http://schemas.microsoft.com/office/drawing/2010/main" w="9525">
                   <a:solidFill>
                     <a:srgbClr val="000000"/>
                   </a:solidFill>
@@ -3924,7 +3929,7 @@
             </a:ln>
             <a:extLst>
               <a:ext uri="{91240B29-F687-4f45-9708-019B960494DF}">
-                <a14:hiddenLine xmlns:a14="http://schemas.microsoft.com/office/drawing/2010/main" xmlns="" w="9525">
+                <a14:hiddenLine xmlns="" xmlns:a14="http://schemas.microsoft.com/office/drawing/2010/main" w="9525">
                   <a:solidFill>
                     <a:srgbClr val="000000"/>
                   </a:solidFill>
@@ -3986,7 +3991,7 @@
             </a:ln>
             <a:extLst>
               <a:ext uri="{91240B29-F687-4f45-9708-019B960494DF}">
-                <a14:hiddenLine xmlns:a14="http://schemas.microsoft.com/office/drawing/2010/main" xmlns="" w="9525">
+                <a14:hiddenLine xmlns="" xmlns:a14="http://schemas.microsoft.com/office/drawing/2010/main" w="9525">
                   <a:solidFill>
                     <a:srgbClr val="000000"/>
                   </a:solidFill>
@@ -4106,7 +4111,7 @@
             </a:ln>
             <a:extLst>
               <a:ext uri="{91240B29-F687-4f45-9708-019B960494DF}">
-                <a14:hiddenLine xmlns:a14="http://schemas.microsoft.com/office/drawing/2010/main" xmlns="" w="9525">
+                <a14:hiddenLine xmlns="" xmlns:a14="http://schemas.microsoft.com/office/drawing/2010/main" w="9525">
                   <a:solidFill>
                     <a:srgbClr val="000000"/>
                   </a:solidFill>
@@ -4174,7 +4179,7 @@
             </a:ln>
             <a:extLst>
               <a:ext uri="{91240B29-F687-4f45-9708-019B960494DF}">
-                <a14:hiddenLine xmlns:a14="http://schemas.microsoft.com/office/drawing/2010/main" xmlns="" w="9525">
+                <a14:hiddenLine xmlns="" xmlns:a14="http://schemas.microsoft.com/office/drawing/2010/main" w="9525">
                   <a:solidFill>
                     <a:srgbClr val="000000"/>
                   </a:solidFill>
@@ -4264,7 +4269,7 @@
             </a:ln>
             <a:extLst>
               <a:ext uri="{91240B29-F687-4f45-9708-019B960494DF}">
-                <a14:hiddenLine xmlns:a14="http://schemas.microsoft.com/office/drawing/2010/main" xmlns="" w="9525">
+                <a14:hiddenLine xmlns="" xmlns:a14="http://schemas.microsoft.com/office/drawing/2010/main" w="9525">
                   <a:solidFill>
                     <a:srgbClr val="000000"/>
                   </a:solidFill>
@@ -4404,7 +4409,7 @@
           <a:p>
             <a:fld id="{48A87A34-81AB-432B-8DAE-1953F412C126}" type="datetimeFigureOut">
               <a:rPr lang="en-US" dirty="0"/>
-              <a:t>11/22/2018</a:t>
+              <a:t>11/26/2018</a:t>
             </a:fld>
             <a:endParaRPr lang="en-US" dirty="0"/>
           </a:p>
@@ -4666,7 +4671,7 @@
           <a:p>
             <a:fld id="{48A87A34-81AB-432B-8DAE-1953F412C126}" type="datetimeFigureOut">
               <a:rPr lang="en-US" dirty="0"/>
-              <a:t>11/22/2018</a:t>
+              <a:t>11/26/2018</a:t>
             </a:fld>
             <a:endParaRPr lang="en-US" dirty="0"/>
           </a:p>
@@ -4857,7 +4862,7 @@
           <a:p>
             <a:fld id="{48A87A34-81AB-432B-8DAE-1953F412C126}" type="datetimeFigureOut">
               <a:rPr lang="en-US" dirty="0"/>
-              <a:t>11/22/2018</a:t>
+              <a:t>11/26/2018</a:t>
             </a:fld>
             <a:endParaRPr lang="en-US" dirty="0"/>
           </a:p>
@@ -5115,7 +5120,7 @@
           <a:p>
             <a:fld id="{48A87A34-81AB-432B-8DAE-1953F412C126}" type="datetimeFigureOut">
               <a:rPr lang="en-US" dirty="0"/>
-              <a:t>11/22/2018</a:t>
+              <a:t>11/26/2018</a:t>
             </a:fld>
             <a:endParaRPr lang="en-US" dirty="0"/>
           </a:p>
@@ -5544,7 +5549,7 @@
           <a:p>
             <a:fld id="{48A87A34-81AB-432B-8DAE-1953F412C126}" type="datetimeFigureOut">
               <a:rPr lang="en-US" dirty="0"/>
-              <a:t>11/22/2018</a:t>
+              <a:t>11/26/2018</a:t>
             </a:fld>
             <a:endParaRPr lang="en-US" dirty="0"/>
           </a:p>
@@ -6085,7 +6090,7 @@
           <a:p>
             <a:fld id="{48A87A34-81AB-432B-8DAE-1953F412C126}" type="datetimeFigureOut">
               <a:rPr lang="en-US" dirty="0"/>
-              <a:t>11/22/2018</a:t>
+              <a:t>11/26/2018</a:t>
             </a:fld>
             <a:endParaRPr lang="en-US" dirty="0"/>
           </a:p>
@@ -6800,7 +6805,7 @@
           <a:p>
             <a:fld id="{48A87A34-81AB-432B-8DAE-1953F412C126}" type="datetimeFigureOut">
               <a:rPr lang="en-US" dirty="0"/>
-              <a:t>11/22/2018</a:t>
+              <a:t>11/26/2018</a:t>
             </a:fld>
             <a:endParaRPr lang="en-US" dirty="0"/>
           </a:p>
@@ -6965,7 +6970,7 @@
           <a:p>
             <a:fld id="{48A87A34-81AB-432B-8DAE-1953F412C126}" type="datetimeFigureOut">
               <a:rPr lang="en-US" dirty="0"/>
-              <a:t>11/22/2018</a:t>
+              <a:t>11/26/2018</a:t>
             </a:fld>
             <a:endParaRPr lang="en-US" dirty="0"/>
           </a:p>
@@ -7140,7 +7145,7 @@
           <a:p>
             <a:fld id="{48A87A34-81AB-432B-8DAE-1953F412C126}" type="datetimeFigureOut">
               <a:rPr lang="en-US" dirty="0"/>
-              <a:t>11/22/2018</a:t>
+              <a:t>11/26/2018</a:t>
             </a:fld>
             <a:endParaRPr lang="en-US" dirty="0"/>
           </a:p>
@@ -7305,7 +7310,7 @@
           <a:p>
             <a:fld id="{48A87A34-81AB-432B-8DAE-1953F412C126}" type="datetimeFigureOut">
               <a:rPr lang="en-US" dirty="0"/>
-              <a:t>11/22/2018</a:t>
+              <a:t>11/26/2018</a:t>
             </a:fld>
             <a:endParaRPr lang="en-US" dirty="0"/>
           </a:p>
@@ -7550,7 +7555,7 @@
           <a:p>
             <a:fld id="{48A87A34-81AB-432B-8DAE-1953F412C126}" type="datetimeFigureOut">
               <a:rPr lang="en-US" dirty="0"/>
-              <a:t>11/22/2018</a:t>
+              <a:t>11/26/2018</a:t>
             </a:fld>
             <a:endParaRPr lang="en-US" dirty="0"/>
           </a:p>
@@ -7777,7 +7782,7 @@
           <a:p>
             <a:fld id="{48A87A34-81AB-432B-8DAE-1953F412C126}" type="datetimeFigureOut">
               <a:rPr lang="en-US" dirty="0"/>
-              <a:t>11/22/2018</a:t>
+              <a:t>11/26/2018</a:t>
             </a:fld>
             <a:endParaRPr lang="en-US" dirty="0"/>
           </a:p>
@@ -8153,7 +8158,7 @@
           <a:p>
             <a:fld id="{48A87A34-81AB-432B-8DAE-1953F412C126}" type="datetimeFigureOut">
               <a:rPr lang="en-US" dirty="0"/>
-              <a:t>11/22/2018</a:t>
+              <a:t>11/26/2018</a:t>
             </a:fld>
             <a:endParaRPr lang="en-US" dirty="0"/>
           </a:p>
@@ -8266,7 +8271,7 @@
           <a:p>
             <a:fld id="{48A87A34-81AB-432B-8DAE-1953F412C126}" type="datetimeFigureOut">
               <a:rPr lang="en-US" dirty="0"/>
-              <a:t>11/22/2018</a:t>
+              <a:t>11/26/2018</a:t>
             </a:fld>
             <a:endParaRPr lang="en-US" dirty="0"/>
           </a:p>
@@ -8356,7 +8361,7 @@
           <a:p>
             <a:fld id="{48A87A34-81AB-432B-8DAE-1953F412C126}" type="datetimeFigureOut">
               <a:rPr lang="en-US" dirty="0"/>
-              <a:t>11/22/2018</a:t>
+              <a:t>11/26/2018</a:t>
             </a:fld>
             <a:endParaRPr lang="en-US" dirty="0"/>
           </a:p>
@@ -8600,7 +8605,7 @@
           <a:p>
             <a:fld id="{48A87A34-81AB-432B-8DAE-1953F412C126}" type="datetimeFigureOut">
               <a:rPr lang="en-US" dirty="0"/>
-              <a:t>11/22/2018</a:t>
+              <a:t>11/26/2018</a:t>
             </a:fld>
             <a:endParaRPr lang="en-US" dirty="0"/>
           </a:p>
@@ -8875,7 +8880,7 @@
           <a:p>
             <a:fld id="{48A87A34-81AB-432B-8DAE-1953F412C126}" type="datetimeFigureOut">
               <a:rPr lang="en-US" dirty="0"/>
-              <a:t>11/22/2018</a:t>
+              <a:t>11/26/2018</a:t>
             </a:fld>
             <a:endParaRPr lang="en-US" dirty="0"/>
           </a:p>
@@ -8993,7 +8998,7 @@
           <a:noFill/>
           <a:extLst>
             <a:ext uri="{909E8E84-426E-40dd-AFC4-6F175D3DCCD1}">
-              <a14:hiddenFill xmlns:a14="http://schemas.microsoft.com/office/drawing/2010/main" xmlns="">
+              <a14:hiddenFill xmlns="" xmlns:a14="http://schemas.microsoft.com/office/drawing/2010/main">
                 <a:solidFill>
                   <a:srgbClr val="FFFFFF"/>
                 </a:solidFill>
@@ -9067,7 +9072,7 @@
               </a:ln>
               <a:extLst>
                 <a:ext uri="{91240B29-F687-4f45-9708-019B960494DF}">
-                  <a14:hiddenLine xmlns:a14="http://schemas.microsoft.com/office/drawing/2010/main" xmlns="" w="9525">
+                  <a14:hiddenLine xmlns="" xmlns:a14="http://schemas.microsoft.com/office/drawing/2010/main" w="9525">
                     <a:solidFill>
                       <a:srgbClr val="000000"/>
                     </a:solidFill>
@@ -9157,7 +9162,7 @@
               </a:ln>
               <a:extLst>
                 <a:ext uri="{91240B29-F687-4f45-9708-019B960494DF}">
-                  <a14:hiddenLine xmlns:a14="http://schemas.microsoft.com/office/drawing/2010/main" xmlns="" w="9525">
+                  <a14:hiddenLine xmlns="" xmlns:a14="http://schemas.microsoft.com/office/drawing/2010/main" w="9525">
                     <a:solidFill>
                       <a:srgbClr val="000000"/>
                     </a:solidFill>
@@ -9247,7 +9252,7 @@
               </a:ln>
               <a:extLst>
                 <a:ext uri="{91240B29-F687-4f45-9708-019B960494DF}">
-                  <a14:hiddenLine xmlns:a14="http://schemas.microsoft.com/office/drawing/2010/main" xmlns="" w="9525">
+                  <a14:hiddenLine xmlns="" xmlns:a14="http://schemas.microsoft.com/office/drawing/2010/main" w="9525">
                     <a:solidFill>
                       <a:srgbClr val="000000"/>
                     </a:solidFill>
@@ -9309,7 +9314,7 @@
               </a:ln>
               <a:extLst>
                 <a:ext uri="{91240B29-F687-4f45-9708-019B960494DF}">
-                  <a14:hiddenLine xmlns:a14="http://schemas.microsoft.com/office/drawing/2010/main" xmlns="" w="9525">
+                  <a14:hiddenLine xmlns="" xmlns:a14="http://schemas.microsoft.com/office/drawing/2010/main" w="9525">
                     <a:solidFill>
                       <a:srgbClr val="000000"/>
                     </a:solidFill>
@@ -9399,7 +9404,7 @@
               </a:ln>
               <a:extLst>
                 <a:ext uri="{91240B29-F687-4f45-9708-019B960494DF}">
-                  <a14:hiddenLine xmlns:a14="http://schemas.microsoft.com/office/drawing/2010/main" xmlns="" w="9525">
+                  <a14:hiddenLine xmlns="" xmlns:a14="http://schemas.microsoft.com/office/drawing/2010/main" w="9525">
                     <a:solidFill>
                       <a:srgbClr val="000000"/>
                     </a:solidFill>
@@ -9461,7 +9466,7 @@
               </a:ln>
               <a:extLst>
                 <a:ext uri="{91240B29-F687-4f45-9708-019B960494DF}">
-                  <a14:hiddenLine xmlns:a14="http://schemas.microsoft.com/office/drawing/2010/main" xmlns="" w="9525">
+                  <a14:hiddenLine xmlns="" xmlns:a14="http://schemas.microsoft.com/office/drawing/2010/main" w="9525">
                     <a:solidFill>
                       <a:srgbClr val="000000"/>
                     </a:solidFill>
@@ -9523,7 +9528,7 @@
               </a:ln>
               <a:extLst>
                 <a:ext uri="{91240B29-F687-4f45-9708-019B960494DF}">
-                  <a14:hiddenLine xmlns:a14="http://schemas.microsoft.com/office/drawing/2010/main" xmlns="" w="9525">
+                  <a14:hiddenLine xmlns="" xmlns:a14="http://schemas.microsoft.com/office/drawing/2010/main" w="9525">
                     <a:solidFill>
                       <a:srgbClr val="000000"/>
                     </a:solidFill>
@@ -9613,7 +9618,7 @@
               </a:ln>
               <a:extLst>
                 <a:ext uri="{91240B29-F687-4f45-9708-019B960494DF}">
-                  <a14:hiddenLine xmlns:a14="http://schemas.microsoft.com/office/drawing/2010/main" xmlns="" w="9525">
+                  <a14:hiddenLine xmlns="" xmlns:a14="http://schemas.microsoft.com/office/drawing/2010/main" w="9525">
                     <a:solidFill>
                       <a:srgbClr val="000000"/>
                     </a:solidFill>
@@ -9703,7 +9708,7 @@
               </a:ln>
               <a:extLst>
                 <a:ext uri="{91240B29-F687-4f45-9708-019B960494DF}">
-                  <a14:hiddenLine xmlns:a14="http://schemas.microsoft.com/office/drawing/2010/main" xmlns="" w="9525">
+                  <a14:hiddenLine xmlns="" xmlns:a14="http://schemas.microsoft.com/office/drawing/2010/main" w="9525">
                     <a:solidFill>
                       <a:srgbClr val="000000"/>
                     </a:solidFill>
@@ -9765,7 +9770,7 @@
               </a:ln>
               <a:extLst>
                 <a:ext uri="{91240B29-F687-4f45-9708-019B960494DF}">
-                  <a14:hiddenLine xmlns:a14="http://schemas.microsoft.com/office/drawing/2010/main" xmlns="" w="9525">
+                  <a14:hiddenLine xmlns="" xmlns:a14="http://schemas.microsoft.com/office/drawing/2010/main" w="9525">
                     <a:solidFill>
                       <a:srgbClr val="000000"/>
                     </a:solidFill>
@@ -9875,7 +9880,7 @@
               </a:ln>
               <a:extLst>
                 <a:ext uri="{91240B29-F687-4f45-9708-019B960494DF}">
-                  <a14:hiddenLine xmlns:a14="http://schemas.microsoft.com/office/drawing/2010/main" xmlns="" w="9525">
+                  <a14:hiddenLine xmlns="" xmlns:a14="http://schemas.microsoft.com/office/drawing/2010/main" w="9525">
                     <a:solidFill>
                       <a:srgbClr val="000000"/>
                     </a:solidFill>
@@ -9959,7 +9964,7 @@
               </a:ln>
               <a:extLst>
                 <a:ext uri="{91240B29-F687-4f45-9708-019B960494DF}">
-                  <a14:hiddenLine xmlns:a14="http://schemas.microsoft.com/office/drawing/2010/main" xmlns="" w="9525">
+                  <a14:hiddenLine xmlns="" xmlns:a14="http://schemas.microsoft.com/office/drawing/2010/main" w="9525">
                     <a:solidFill>
                       <a:srgbClr val="000000"/>
                     </a:solidFill>
@@ -10021,7 +10026,7 @@
               </a:ln>
               <a:extLst>
                 <a:ext uri="{91240B29-F687-4f45-9708-019B960494DF}">
-                  <a14:hiddenLine xmlns:a14="http://schemas.microsoft.com/office/drawing/2010/main" xmlns="" w="9525">
+                  <a14:hiddenLine xmlns="" xmlns:a14="http://schemas.microsoft.com/office/drawing/2010/main" w="9525">
                     <a:solidFill>
                       <a:srgbClr val="000000"/>
                     </a:solidFill>
@@ -10083,7 +10088,7 @@
               </a:ln>
               <a:extLst>
                 <a:ext uri="{91240B29-F687-4f45-9708-019B960494DF}">
-                  <a14:hiddenLine xmlns:a14="http://schemas.microsoft.com/office/drawing/2010/main" xmlns="" w="9525">
+                  <a14:hiddenLine xmlns="" xmlns:a14="http://schemas.microsoft.com/office/drawing/2010/main" w="9525">
                     <a:solidFill>
                       <a:srgbClr val="000000"/>
                     </a:solidFill>
@@ -10173,7 +10178,7 @@
               </a:ln>
               <a:extLst>
                 <a:ext uri="{91240B29-F687-4f45-9708-019B960494DF}">
-                  <a14:hiddenLine xmlns:a14="http://schemas.microsoft.com/office/drawing/2010/main" xmlns="" w="9525">
+                  <a14:hiddenLine xmlns="" xmlns:a14="http://schemas.microsoft.com/office/drawing/2010/main" w="9525">
                     <a:solidFill>
                       <a:srgbClr val="000000"/>
                     </a:solidFill>
@@ -10207,7 +10212,7 @@
               </a:ln>
               <a:extLst>
                 <a:ext uri="{91240B29-F687-4f45-9708-019B960494DF}">
-                  <a14:hiddenLine xmlns:a14="http://schemas.microsoft.com/office/drawing/2010/main" xmlns="" w="9525">
+                  <a14:hiddenLine xmlns="" xmlns:a14="http://schemas.microsoft.com/office/drawing/2010/main" w="9525">
                     <a:solidFill>
                       <a:srgbClr val="000000"/>
                     </a:solidFill>
@@ -10272,7 +10277,7 @@
               </a:ln>
               <a:extLst>
                 <a:ext uri="{91240B29-F687-4f45-9708-019B960494DF}">
-                  <a14:hiddenLine xmlns:a14="http://schemas.microsoft.com/office/drawing/2010/main" xmlns="" w="9525">
+                  <a14:hiddenLine xmlns="" xmlns:a14="http://schemas.microsoft.com/office/drawing/2010/main" w="9525">
                     <a:solidFill>
                       <a:srgbClr val="000000"/>
                     </a:solidFill>
@@ -10362,7 +10367,7 @@
               </a:ln>
               <a:extLst>
                 <a:ext uri="{91240B29-F687-4f45-9708-019B960494DF}">
-                  <a14:hiddenLine xmlns:a14="http://schemas.microsoft.com/office/drawing/2010/main" xmlns="" w="9525">
+                  <a14:hiddenLine xmlns="" xmlns:a14="http://schemas.microsoft.com/office/drawing/2010/main" w="9525">
                     <a:solidFill>
                       <a:srgbClr val="000000"/>
                     </a:solidFill>
@@ -10424,7 +10429,7 @@
               </a:ln>
               <a:extLst>
                 <a:ext uri="{91240B29-F687-4f45-9708-019B960494DF}">
-                  <a14:hiddenLine xmlns:a14="http://schemas.microsoft.com/office/drawing/2010/main" xmlns="" w="9525">
+                  <a14:hiddenLine xmlns="" xmlns:a14="http://schemas.microsoft.com/office/drawing/2010/main" w="9525">
                     <a:solidFill>
                       <a:srgbClr val="000000"/>
                     </a:solidFill>
@@ -10514,7 +10519,7 @@
               </a:ln>
               <a:extLst>
                 <a:ext uri="{91240B29-F687-4f45-9708-019B960494DF}">
-                  <a14:hiddenLine xmlns:a14="http://schemas.microsoft.com/office/drawing/2010/main" xmlns="" w="9525">
+                  <a14:hiddenLine xmlns="" xmlns:a14="http://schemas.microsoft.com/office/drawing/2010/main" w="9525">
                     <a:solidFill>
                       <a:srgbClr val="000000"/>
                     </a:solidFill>
@@ -10579,7 +10584,7 @@
               </a:ln>
               <a:extLst>
                 <a:ext uri="{91240B29-F687-4f45-9708-019B960494DF}">
-                  <a14:hiddenLine xmlns:a14="http://schemas.microsoft.com/office/drawing/2010/main" xmlns="" w="9525">
+                  <a14:hiddenLine xmlns="" xmlns:a14="http://schemas.microsoft.com/office/drawing/2010/main" w="9525">
                     <a:solidFill>
                       <a:srgbClr val="000000"/>
                     </a:solidFill>
@@ -10641,7 +10646,7 @@
               </a:ln>
               <a:extLst>
                 <a:ext uri="{91240B29-F687-4f45-9708-019B960494DF}">
-                  <a14:hiddenLine xmlns:a14="http://schemas.microsoft.com/office/drawing/2010/main" xmlns="" w="9525">
+                  <a14:hiddenLine xmlns="" xmlns:a14="http://schemas.microsoft.com/office/drawing/2010/main" w="9525">
                     <a:solidFill>
                       <a:srgbClr val="000000"/>
                     </a:solidFill>
@@ -10731,7 +10736,7 @@
               </a:ln>
               <a:extLst>
                 <a:ext uri="{91240B29-F687-4f45-9708-019B960494DF}">
-                  <a14:hiddenLine xmlns:a14="http://schemas.microsoft.com/office/drawing/2010/main" xmlns="" w="9525">
+                  <a14:hiddenLine xmlns="" xmlns:a14="http://schemas.microsoft.com/office/drawing/2010/main" w="9525">
                     <a:solidFill>
                       <a:srgbClr val="000000"/>
                     </a:solidFill>
@@ -10821,7 +10826,7 @@
               </a:ln>
               <a:extLst>
                 <a:ext uri="{91240B29-F687-4f45-9708-019B960494DF}">
-                  <a14:hiddenLine xmlns:a14="http://schemas.microsoft.com/office/drawing/2010/main" xmlns="" w="9525">
+                  <a14:hiddenLine xmlns="" xmlns:a14="http://schemas.microsoft.com/office/drawing/2010/main" w="9525">
                     <a:solidFill>
                       <a:srgbClr val="000000"/>
                     </a:solidFill>
@@ -10886,7 +10891,7 @@
               </a:ln>
               <a:extLst>
                 <a:ext uri="{91240B29-F687-4f45-9708-019B960494DF}">
-                  <a14:hiddenLine xmlns:a14="http://schemas.microsoft.com/office/drawing/2010/main" xmlns="" w="9525">
+                  <a14:hiddenLine xmlns="" xmlns:a14="http://schemas.microsoft.com/office/drawing/2010/main" w="9525">
                     <a:solidFill>
                       <a:srgbClr val="000000"/>
                     </a:solidFill>
@@ -11006,7 +11011,7 @@
               </a:ln>
               <a:extLst>
                 <a:ext uri="{91240B29-F687-4f45-9708-019B960494DF}">
-                  <a14:hiddenLine xmlns:a14="http://schemas.microsoft.com/office/drawing/2010/main" xmlns="" w="9525">
+                  <a14:hiddenLine xmlns="" xmlns:a14="http://schemas.microsoft.com/office/drawing/2010/main" w="9525">
                     <a:solidFill>
                       <a:srgbClr val="000000"/>
                     </a:solidFill>
@@ -11087,7 +11092,7 @@
               </a:ln>
               <a:extLst>
                 <a:ext uri="{91240B29-F687-4f45-9708-019B960494DF}">
-                  <a14:hiddenLine xmlns:a14="http://schemas.microsoft.com/office/drawing/2010/main" xmlns="" w="9525">
+                  <a14:hiddenLine xmlns="" xmlns:a14="http://schemas.microsoft.com/office/drawing/2010/main" w="9525">
                     <a:solidFill>
                       <a:srgbClr val="000000"/>
                     </a:solidFill>
@@ -11202,7 +11207,7 @@
               </a:ln>
               <a:extLst>
                 <a:ext uri="{91240B29-F687-4f45-9708-019B960494DF}">
-                  <a14:hiddenLine xmlns:a14="http://schemas.microsoft.com/office/drawing/2010/main" xmlns="" w="9525">
+                  <a14:hiddenLine xmlns="" xmlns:a14="http://schemas.microsoft.com/office/drawing/2010/main" w="9525">
                     <a:solidFill>
                       <a:srgbClr val="000000"/>
                     </a:solidFill>
@@ -11292,7 +11297,7 @@
               </a:ln>
               <a:extLst>
                 <a:ext uri="{91240B29-F687-4f45-9708-019B960494DF}">
-                  <a14:hiddenLine xmlns:a14="http://schemas.microsoft.com/office/drawing/2010/main" xmlns="" w="9525">
+                  <a14:hiddenLine xmlns="" xmlns:a14="http://schemas.microsoft.com/office/drawing/2010/main" w="9525">
                     <a:solidFill>
                       <a:srgbClr val="000000"/>
                     </a:solidFill>
@@ -11357,7 +11362,7 @@
               </a:ln>
               <a:extLst>
                 <a:ext uri="{91240B29-F687-4f45-9708-019B960494DF}">
-                  <a14:hiddenLine xmlns:a14="http://schemas.microsoft.com/office/drawing/2010/main" xmlns="" w="9525">
+                  <a14:hiddenLine xmlns="" xmlns:a14="http://schemas.microsoft.com/office/drawing/2010/main" w="9525">
                     <a:solidFill>
                       <a:srgbClr val="000000"/>
                     </a:solidFill>
@@ -11447,7 +11452,7 @@
               </a:ln>
               <a:extLst>
                 <a:ext uri="{91240B29-F687-4f45-9708-019B960494DF}">
-                  <a14:hiddenLine xmlns:a14="http://schemas.microsoft.com/office/drawing/2010/main" xmlns="" w="9525">
+                  <a14:hiddenLine xmlns="" xmlns:a14="http://schemas.microsoft.com/office/drawing/2010/main" w="9525">
                     <a:solidFill>
                       <a:srgbClr val="000000"/>
                     </a:solidFill>
@@ -11515,7 +11520,7 @@
               </a:ln>
               <a:extLst>
                 <a:ext uri="{91240B29-F687-4f45-9708-019B960494DF}">
-                  <a14:hiddenLine xmlns:a14="http://schemas.microsoft.com/office/drawing/2010/main" xmlns="" w="9525">
+                  <a14:hiddenLine xmlns="" xmlns:a14="http://schemas.microsoft.com/office/drawing/2010/main" w="9525">
                     <a:solidFill>
                       <a:srgbClr val="000000"/>
                     </a:solidFill>
@@ -11605,7 +11610,7 @@
               </a:ln>
               <a:extLst>
                 <a:ext uri="{91240B29-F687-4f45-9708-019B960494DF}">
-                  <a14:hiddenLine xmlns:a14="http://schemas.microsoft.com/office/drawing/2010/main" xmlns="" w="9525">
+                  <a14:hiddenLine xmlns="" xmlns:a14="http://schemas.microsoft.com/office/drawing/2010/main" w="9525">
                     <a:solidFill>
                       <a:srgbClr val="000000"/>
                     </a:solidFill>
@@ -11673,7 +11678,7 @@
               </a:ln>
               <a:extLst>
                 <a:ext uri="{91240B29-F687-4f45-9708-019B960494DF}">
-                  <a14:hiddenLine xmlns:a14="http://schemas.microsoft.com/office/drawing/2010/main" xmlns="" w="9525">
+                  <a14:hiddenLine xmlns="" xmlns:a14="http://schemas.microsoft.com/office/drawing/2010/main" w="9525">
                     <a:solidFill>
                       <a:srgbClr val="000000"/>
                     </a:solidFill>
@@ -11763,7 +11768,7 @@
               </a:ln>
               <a:extLst>
                 <a:ext uri="{91240B29-F687-4f45-9708-019B960494DF}">
-                  <a14:hiddenLine xmlns:a14="http://schemas.microsoft.com/office/drawing/2010/main" xmlns="" w="9525">
+                  <a14:hiddenLine xmlns="" xmlns:a14="http://schemas.microsoft.com/office/drawing/2010/main" w="9525">
                     <a:solidFill>
                       <a:srgbClr val="000000"/>
                     </a:solidFill>
@@ -11797,7 +11802,7 @@
               </a:ln>
               <a:extLst>
                 <a:ext uri="{91240B29-F687-4f45-9708-019B960494DF}">
-                  <a14:hiddenLine xmlns:a14="http://schemas.microsoft.com/office/drawing/2010/main" xmlns="" w="9525">
+                  <a14:hiddenLine xmlns="" xmlns:a14="http://schemas.microsoft.com/office/drawing/2010/main" w="9525">
                     <a:solidFill>
                       <a:srgbClr val="000000"/>
                     </a:solidFill>
@@ -11938,7 +11943,7 @@
             <a:fld id="{48A87A34-81AB-432B-8DAE-1953F412C126}" type="datetimeFigureOut">
               <a:rPr lang="en-US" dirty="0"/>
               <a:pPr/>
-              <a:t>11/22/2018</a:t>
+              <a:t>11/26/2018</a:t>
             </a:fld>
             <a:endParaRPr lang="en-US" dirty="0"/>
           </a:p>
@@ -13299,7 +13304,7 @@
           <a:p>
             <a:r>
               <a:rPr lang="en-GB" dirty="0"/>
-              <a:t>Because of performance (CPU, RAM, IO)</a:t>
+              <a:t>Because of the performance issues (CPU, RAM, IO)</a:t>
             </a:r>
           </a:p>
           <a:p>
@@ -13598,6 +13603,16 @@
           <a:p>
             <a:r>
               <a:rPr lang="en-GB" dirty="0"/>
+              <a:t>Get to know </a:t>
+            </a:r>
+            <a:r>
+              <a:rPr lang="en-GB"/>
+              <a:t>your technology</a:t>
+            </a:r>
+          </a:p>
+          <a:p>
+            <a:r>
+              <a:rPr lang="en-GB" dirty="0"/>
               <a:t>Choose technology for good reasons </a:t>
             </a:r>
           </a:p>
@@ -13817,6 +13832,55 @@
                       </p:childTnLst>
                     </p:cTn>
                   </p:par>
+                  <p:par>
+                    <p:cTn id="19" fill="hold">
+                      <p:stCondLst>
+                        <p:cond delay="indefinite"/>
+                      </p:stCondLst>
+                      <p:childTnLst>
+                        <p:par>
+                          <p:cTn id="20" fill="hold">
+                            <p:stCondLst>
+                              <p:cond delay="0"/>
+                            </p:stCondLst>
+                            <p:childTnLst>
+                              <p:par>
+                                <p:cTn id="21" presetID="1" presetClass="entr" presetSubtype="0" fill="hold" grpId="0" nodeType="clickEffect">
+                                  <p:stCondLst>
+                                    <p:cond delay="0"/>
+                                  </p:stCondLst>
+                                  <p:childTnLst>
+                                    <p:set>
+                                      <p:cBhvr>
+                                        <p:cTn id="22" dur="1" fill="hold">
+                                          <p:stCondLst>
+                                            <p:cond delay="0"/>
+                                          </p:stCondLst>
+                                        </p:cTn>
+                                        <p:tgtEl>
+                                          <p:spTgt spid="3">
+                                            <p:txEl>
+                                              <p:pRg st="4" end="4"/>
+                                            </p:txEl>
+                                          </p:spTgt>
+                                        </p:tgtEl>
+                                        <p:attrNameLst>
+                                          <p:attrName>style.visibility</p:attrName>
+                                        </p:attrNameLst>
+                                      </p:cBhvr>
+                                      <p:to>
+                                        <p:strVal val="visible"/>
+                                      </p:to>
+                                    </p:set>
+                                  </p:childTnLst>
+                                </p:cTn>
+                              </p:par>
+                            </p:childTnLst>
+                          </p:cTn>
+                        </p:par>
+                      </p:childTnLst>
+                    </p:cTn>
+                  </p:par>
                 </p:childTnLst>
               </p:cTn>
               <p:prevCondLst>
@@ -13925,7 +13989,7 @@
               <a:rPr lang="en-GB" dirty="0">
                 <a:hlinkClick r:id="rId2"/>
               </a:rPr>
-              <a:t>https://github.com/michalporeba/sharing/not-so-sql</a:t>
+              <a:t>https://github.com/michalporeba/sharing/tree/master/not-so-sql</a:t>
             </a:r>
             <a:endParaRPr lang="en-GB" dirty="0"/>
           </a:p>
@@ -14803,6 +14867,333 @@
   <p:clrMapOvr>
     <a:masterClrMapping/>
   </p:clrMapOvr>
+  <p:timing>
+    <p:tnLst>
+      <p:par>
+        <p:cTn id="1" dur="indefinite" restart="never" nodeType="tmRoot">
+          <p:childTnLst>
+            <p:seq concurrent="1" nextAc="seek">
+              <p:cTn id="2" dur="indefinite" nodeType="mainSeq">
+                <p:childTnLst>
+                  <p:par>
+                    <p:cTn id="3" fill="hold">
+                      <p:stCondLst>
+                        <p:cond delay="indefinite"/>
+                      </p:stCondLst>
+                      <p:childTnLst>
+                        <p:par>
+                          <p:cTn id="4" fill="hold">
+                            <p:stCondLst>
+                              <p:cond delay="0"/>
+                            </p:stCondLst>
+                            <p:childTnLst>
+                              <p:par>
+                                <p:cTn id="5" presetID="1" presetClass="entr" presetSubtype="0" fill="hold" grpId="0" nodeType="clickEffect">
+                                  <p:stCondLst>
+                                    <p:cond delay="0"/>
+                                  </p:stCondLst>
+                                  <p:childTnLst>
+                                    <p:set>
+                                      <p:cBhvr>
+                                        <p:cTn id="6" dur="1" fill="hold">
+                                          <p:stCondLst>
+                                            <p:cond delay="0"/>
+                                          </p:stCondLst>
+                                        </p:cTn>
+                                        <p:tgtEl>
+                                          <p:spTgt spid="3">
+                                            <p:txEl>
+                                              <p:pRg st="0" end="0"/>
+                                            </p:txEl>
+                                          </p:spTgt>
+                                        </p:tgtEl>
+                                        <p:attrNameLst>
+                                          <p:attrName>style.visibility</p:attrName>
+                                        </p:attrNameLst>
+                                      </p:cBhvr>
+                                      <p:to>
+                                        <p:strVal val="visible"/>
+                                      </p:to>
+                                    </p:set>
+                                  </p:childTnLst>
+                                </p:cTn>
+                              </p:par>
+                            </p:childTnLst>
+                          </p:cTn>
+                        </p:par>
+                      </p:childTnLst>
+                    </p:cTn>
+                  </p:par>
+                  <p:par>
+                    <p:cTn id="7" fill="hold">
+                      <p:stCondLst>
+                        <p:cond delay="indefinite"/>
+                      </p:stCondLst>
+                      <p:childTnLst>
+                        <p:par>
+                          <p:cTn id="8" fill="hold">
+                            <p:stCondLst>
+                              <p:cond delay="0"/>
+                            </p:stCondLst>
+                            <p:childTnLst>
+                              <p:par>
+                                <p:cTn id="9" presetID="1" presetClass="entr" presetSubtype="0" fill="hold" grpId="0" nodeType="clickEffect">
+                                  <p:stCondLst>
+                                    <p:cond delay="0"/>
+                                  </p:stCondLst>
+                                  <p:childTnLst>
+                                    <p:set>
+                                      <p:cBhvr>
+                                        <p:cTn id="10" dur="1" fill="hold">
+                                          <p:stCondLst>
+                                            <p:cond delay="0"/>
+                                          </p:stCondLst>
+                                        </p:cTn>
+                                        <p:tgtEl>
+                                          <p:spTgt spid="3">
+                                            <p:txEl>
+                                              <p:pRg st="1" end="1"/>
+                                            </p:txEl>
+                                          </p:spTgt>
+                                        </p:tgtEl>
+                                        <p:attrNameLst>
+                                          <p:attrName>style.visibility</p:attrName>
+                                        </p:attrNameLst>
+                                      </p:cBhvr>
+                                      <p:to>
+                                        <p:strVal val="visible"/>
+                                      </p:to>
+                                    </p:set>
+                                  </p:childTnLst>
+                                </p:cTn>
+                              </p:par>
+                            </p:childTnLst>
+                          </p:cTn>
+                        </p:par>
+                      </p:childTnLst>
+                    </p:cTn>
+                  </p:par>
+                  <p:par>
+                    <p:cTn id="11" fill="hold">
+                      <p:stCondLst>
+                        <p:cond delay="indefinite"/>
+                      </p:stCondLst>
+                      <p:childTnLst>
+                        <p:par>
+                          <p:cTn id="12" fill="hold">
+                            <p:stCondLst>
+                              <p:cond delay="0"/>
+                            </p:stCondLst>
+                            <p:childTnLst>
+                              <p:par>
+                                <p:cTn id="13" presetID="1" presetClass="entr" presetSubtype="0" fill="hold" grpId="0" nodeType="clickEffect">
+                                  <p:stCondLst>
+                                    <p:cond delay="0"/>
+                                  </p:stCondLst>
+                                  <p:childTnLst>
+                                    <p:set>
+                                      <p:cBhvr>
+                                        <p:cTn id="14" dur="1" fill="hold">
+                                          <p:stCondLst>
+                                            <p:cond delay="0"/>
+                                          </p:stCondLst>
+                                        </p:cTn>
+                                        <p:tgtEl>
+                                          <p:spTgt spid="3">
+                                            <p:txEl>
+                                              <p:pRg st="2" end="2"/>
+                                            </p:txEl>
+                                          </p:spTgt>
+                                        </p:tgtEl>
+                                        <p:attrNameLst>
+                                          <p:attrName>style.visibility</p:attrName>
+                                        </p:attrNameLst>
+                                      </p:cBhvr>
+                                      <p:to>
+                                        <p:strVal val="visible"/>
+                                      </p:to>
+                                    </p:set>
+                                  </p:childTnLst>
+                                </p:cTn>
+                              </p:par>
+                            </p:childTnLst>
+                          </p:cTn>
+                        </p:par>
+                      </p:childTnLst>
+                    </p:cTn>
+                  </p:par>
+                  <p:par>
+                    <p:cTn id="15" fill="hold">
+                      <p:stCondLst>
+                        <p:cond delay="indefinite"/>
+                      </p:stCondLst>
+                      <p:childTnLst>
+                        <p:par>
+                          <p:cTn id="16" fill="hold">
+                            <p:stCondLst>
+                              <p:cond delay="0"/>
+                            </p:stCondLst>
+                            <p:childTnLst>
+                              <p:par>
+                                <p:cTn id="17" presetID="1" presetClass="entr" presetSubtype="0" fill="hold" grpId="0" nodeType="clickEffect">
+                                  <p:stCondLst>
+                                    <p:cond delay="0"/>
+                                  </p:stCondLst>
+                                  <p:childTnLst>
+                                    <p:set>
+                                      <p:cBhvr>
+                                        <p:cTn id="18" dur="1" fill="hold">
+                                          <p:stCondLst>
+                                            <p:cond delay="0"/>
+                                          </p:stCondLst>
+                                        </p:cTn>
+                                        <p:tgtEl>
+                                          <p:spTgt spid="3">
+                                            <p:txEl>
+                                              <p:pRg st="3" end="3"/>
+                                            </p:txEl>
+                                          </p:spTgt>
+                                        </p:tgtEl>
+                                        <p:attrNameLst>
+                                          <p:attrName>style.visibility</p:attrName>
+                                        </p:attrNameLst>
+                                      </p:cBhvr>
+                                      <p:to>
+                                        <p:strVal val="visible"/>
+                                      </p:to>
+                                    </p:set>
+                                  </p:childTnLst>
+                                </p:cTn>
+                              </p:par>
+                            </p:childTnLst>
+                          </p:cTn>
+                        </p:par>
+                      </p:childTnLst>
+                    </p:cTn>
+                  </p:par>
+                  <p:par>
+                    <p:cTn id="19" fill="hold">
+                      <p:stCondLst>
+                        <p:cond delay="indefinite"/>
+                      </p:stCondLst>
+                      <p:childTnLst>
+                        <p:par>
+                          <p:cTn id="20" fill="hold">
+                            <p:stCondLst>
+                              <p:cond delay="0"/>
+                            </p:stCondLst>
+                            <p:childTnLst>
+                              <p:par>
+                                <p:cTn id="21" presetID="1" presetClass="entr" presetSubtype="0" fill="hold" grpId="0" nodeType="clickEffect">
+                                  <p:stCondLst>
+                                    <p:cond delay="0"/>
+                                  </p:stCondLst>
+                                  <p:childTnLst>
+                                    <p:set>
+                                      <p:cBhvr>
+                                        <p:cTn id="22" dur="1" fill="hold">
+                                          <p:stCondLst>
+                                            <p:cond delay="0"/>
+                                          </p:stCondLst>
+                                        </p:cTn>
+                                        <p:tgtEl>
+                                          <p:spTgt spid="3">
+                                            <p:txEl>
+                                              <p:pRg st="4" end="4"/>
+                                            </p:txEl>
+                                          </p:spTgt>
+                                        </p:tgtEl>
+                                        <p:attrNameLst>
+                                          <p:attrName>style.visibility</p:attrName>
+                                        </p:attrNameLst>
+                                      </p:cBhvr>
+                                      <p:to>
+                                        <p:strVal val="visible"/>
+                                      </p:to>
+                                    </p:set>
+                                  </p:childTnLst>
+                                </p:cTn>
+                              </p:par>
+                            </p:childTnLst>
+                          </p:cTn>
+                        </p:par>
+                      </p:childTnLst>
+                    </p:cTn>
+                  </p:par>
+                  <p:par>
+                    <p:cTn id="23" fill="hold">
+                      <p:stCondLst>
+                        <p:cond delay="indefinite"/>
+                      </p:stCondLst>
+                      <p:childTnLst>
+                        <p:par>
+                          <p:cTn id="24" fill="hold">
+                            <p:stCondLst>
+                              <p:cond delay="0"/>
+                            </p:stCondLst>
+                            <p:childTnLst>
+                              <p:par>
+                                <p:cTn id="25" presetID="1" presetClass="entr" presetSubtype="0" fill="hold" grpId="0" nodeType="clickEffect">
+                                  <p:stCondLst>
+                                    <p:cond delay="0"/>
+                                  </p:stCondLst>
+                                  <p:childTnLst>
+                                    <p:set>
+                                      <p:cBhvr>
+                                        <p:cTn id="26" dur="1" fill="hold">
+                                          <p:stCondLst>
+                                            <p:cond delay="0"/>
+                                          </p:stCondLst>
+                                        </p:cTn>
+                                        <p:tgtEl>
+                                          <p:spTgt spid="3">
+                                            <p:txEl>
+                                              <p:pRg st="5" end="5"/>
+                                            </p:txEl>
+                                          </p:spTgt>
+                                        </p:tgtEl>
+                                        <p:attrNameLst>
+                                          <p:attrName>style.visibility</p:attrName>
+                                        </p:attrNameLst>
+                                      </p:cBhvr>
+                                      <p:to>
+                                        <p:strVal val="visible"/>
+                                      </p:to>
+                                    </p:set>
+                                  </p:childTnLst>
+                                </p:cTn>
+                              </p:par>
+                            </p:childTnLst>
+                          </p:cTn>
+                        </p:par>
+                      </p:childTnLst>
+                    </p:cTn>
+                  </p:par>
+                </p:childTnLst>
+              </p:cTn>
+              <p:prevCondLst>
+                <p:cond evt="onPrev" delay="0">
+                  <p:tgtEl>
+                    <p:sldTgt/>
+                  </p:tgtEl>
+                </p:cond>
+              </p:prevCondLst>
+              <p:nextCondLst>
+                <p:cond evt="onNext" delay="0">
+                  <p:tgtEl>
+                    <p:sldTgt/>
+                  </p:tgtEl>
+                </p:cond>
+              </p:nextCondLst>
+            </p:seq>
+          </p:childTnLst>
+        </p:cTn>
+      </p:par>
+    </p:tnLst>
+    <p:bldLst>
+      <p:bldP spid="3" grpId="0" build="p"/>
+    </p:bldLst>
+  </p:timing>
 </p:sld>
 </file>
 
@@ -14846,7 +15237,7 @@
           <a:p>
             <a:r>
               <a:rPr lang="en-GB" dirty="0"/>
-              <a:t>The Short SQL Story</a:t>
+              <a:t>The SQL Story</a:t>
             </a:r>
           </a:p>
         </p:txBody>
@@ -14893,6 +15284,12 @@
             <a:r>
               <a:rPr lang="en-GB" dirty="0"/>
               <a:t>ANSI SQL-86</a:t>
+            </a:r>
+          </a:p>
+          <a:p>
+            <a:r>
+              <a:rPr lang="en-GB" dirty="0"/>
+              <a:t>A few minor revisions</a:t>
             </a:r>
           </a:p>
           <a:p>
@@ -14999,7 +15396,7 @@
           <a:p>
             <a:r>
               <a:rPr lang="en-GB" dirty="0"/>
-              <a:t>Inflexibility of the write time schema</a:t>
+              <a:t>Inflexibility of the write-time schema</a:t>
             </a:r>
           </a:p>
           <a:p>

</xml_diff>

<commit_message>
updates after the first not so sql talk
</commit_message>
<xml_diff>
--- a/not-so-sql/Not So SQL Anymore v1.pptx
+++ b/not-so-sql/Not So SQL Anymore v1.pptx
@@ -20,7 +20,8 @@
     <p:sldId id="269" r:id="rId14"/>
     <p:sldId id="270" r:id="rId15"/>
     <p:sldId id="271" r:id="rId16"/>
-    <p:sldId id="272" r:id="rId17"/>
+    <p:sldId id="273" r:id="rId17"/>
+    <p:sldId id="272" r:id="rId18"/>
   </p:sldIdLst>
   <p:sldSz cx="12192000" cy="6858000"/>
   <p:notesSz cx="6858000" cy="9144000"/>
@@ -184,7 +185,7 @@
           <a:noFill/>
           <a:extLst>
             <a:ext uri="{909E8E84-426E-40dd-AFC4-6F175D3DCCD1}">
-              <a14:hiddenFill xmlns="" xmlns:a14="http://schemas.microsoft.com/office/drawing/2010/main">
+              <a14:hiddenFill xmlns:a14="http://schemas.microsoft.com/office/drawing/2010/main" xmlns="">
                 <a:solidFill>
                   <a:srgbClr val="FFFFFF"/>
                 </a:solidFill>
@@ -243,7 +244,7 @@
             </a:ln>
             <a:extLst>
               <a:ext uri="{91240B29-F687-4f45-9708-019B960494DF}">
-                <a14:hiddenLine xmlns="" xmlns:a14="http://schemas.microsoft.com/office/drawing/2010/main" w="9525">
+                <a14:hiddenLine xmlns:a14="http://schemas.microsoft.com/office/drawing/2010/main" xmlns="" w="9525">
                   <a:solidFill>
                     <a:srgbClr val="000000"/>
                   </a:solidFill>
@@ -333,7 +334,7 @@
             </a:ln>
             <a:extLst>
               <a:ext uri="{91240B29-F687-4f45-9708-019B960494DF}">
-                <a14:hiddenLine xmlns="" xmlns:a14="http://schemas.microsoft.com/office/drawing/2010/main" w="9525">
+                <a14:hiddenLine xmlns:a14="http://schemas.microsoft.com/office/drawing/2010/main" xmlns="" w="9525">
                   <a:solidFill>
                     <a:srgbClr val="000000"/>
                   </a:solidFill>
@@ -423,7 +424,7 @@
             </a:ln>
             <a:extLst>
               <a:ext uri="{91240B29-F687-4f45-9708-019B960494DF}">
-                <a14:hiddenLine xmlns="" xmlns:a14="http://schemas.microsoft.com/office/drawing/2010/main" w="9525">
+                <a14:hiddenLine xmlns:a14="http://schemas.microsoft.com/office/drawing/2010/main" xmlns="" w="9525">
                   <a:solidFill>
                     <a:srgbClr val="000000"/>
                   </a:solidFill>
@@ -457,7 +458,7 @@
             </a:ln>
             <a:extLst>
               <a:ext uri="{91240B29-F687-4f45-9708-019B960494DF}">
-                <a14:hiddenLine xmlns="" xmlns:a14="http://schemas.microsoft.com/office/drawing/2010/main" w="9525">
+                <a14:hiddenLine xmlns:a14="http://schemas.microsoft.com/office/drawing/2010/main" xmlns="" w="9525">
                   <a:solidFill>
                     <a:srgbClr val="000000"/>
                   </a:solidFill>
@@ -547,7 +548,7 @@
             </a:ln>
             <a:extLst>
               <a:ext uri="{91240B29-F687-4f45-9708-019B960494DF}">
-                <a14:hiddenLine xmlns="" xmlns:a14="http://schemas.microsoft.com/office/drawing/2010/main" w="9525">
+                <a14:hiddenLine xmlns:a14="http://schemas.microsoft.com/office/drawing/2010/main" xmlns="" w="9525">
                   <a:solidFill>
                     <a:srgbClr val="000000"/>
                   </a:solidFill>
@@ -609,7 +610,7 @@
             </a:ln>
             <a:extLst>
               <a:ext uri="{91240B29-F687-4f45-9708-019B960494DF}">
-                <a14:hiddenLine xmlns="" xmlns:a14="http://schemas.microsoft.com/office/drawing/2010/main" w="9525">
+                <a14:hiddenLine xmlns:a14="http://schemas.microsoft.com/office/drawing/2010/main" xmlns="" w="9525">
                   <a:solidFill>
                     <a:srgbClr val="000000"/>
                   </a:solidFill>
@@ -671,7 +672,7 @@
             </a:ln>
             <a:extLst>
               <a:ext uri="{91240B29-F687-4f45-9708-019B960494DF}">
-                <a14:hiddenLine xmlns="" xmlns:a14="http://schemas.microsoft.com/office/drawing/2010/main" w="9525">
+                <a14:hiddenLine xmlns:a14="http://schemas.microsoft.com/office/drawing/2010/main" xmlns="" w="9525">
                   <a:solidFill>
                     <a:srgbClr val="000000"/>
                   </a:solidFill>
@@ -761,7 +762,7 @@
             </a:ln>
             <a:extLst>
               <a:ext uri="{91240B29-F687-4f45-9708-019B960494DF}">
-                <a14:hiddenLine xmlns="" xmlns:a14="http://schemas.microsoft.com/office/drawing/2010/main" w="9525">
+                <a14:hiddenLine xmlns:a14="http://schemas.microsoft.com/office/drawing/2010/main" xmlns="" w="9525">
                   <a:solidFill>
                     <a:srgbClr val="000000"/>
                   </a:solidFill>
@@ -823,7 +824,7 @@
             </a:ln>
             <a:extLst>
               <a:ext uri="{91240B29-F687-4f45-9708-019B960494DF}">
-                <a14:hiddenLine xmlns="" xmlns:a14="http://schemas.microsoft.com/office/drawing/2010/main" w="9525">
+                <a14:hiddenLine xmlns:a14="http://schemas.microsoft.com/office/drawing/2010/main" xmlns="" w="9525">
                   <a:solidFill>
                     <a:srgbClr val="000000"/>
                   </a:solidFill>
@@ -885,7 +886,7 @@
             </a:ln>
             <a:extLst>
               <a:ext uri="{91240B29-F687-4f45-9708-019B960494DF}">
-                <a14:hiddenLine xmlns="" xmlns:a14="http://schemas.microsoft.com/office/drawing/2010/main" w="9525">
+                <a14:hiddenLine xmlns:a14="http://schemas.microsoft.com/office/drawing/2010/main" xmlns="" w="9525">
                   <a:solidFill>
                     <a:srgbClr val="000000"/>
                   </a:solidFill>
@@ -975,7 +976,7 @@
             </a:ln>
             <a:extLst>
               <a:ext uri="{91240B29-F687-4f45-9708-019B960494DF}">
-                <a14:hiddenLine xmlns="" xmlns:a14="http://schemas.microsoft.com/office/drawing/2010/main" w="9525">
+                <a14:hiddenLine xmlns:a14="http://schemas.microsoft.com/office/drawing/2010/main" xmlns="" w="9525">
                   <a:solidFill>
                     <a:srgbClr val="000000"/>
                   </a:solidFill>
@@ -1065,7 +1066,7 @@
             </a:ln>
             <a:extLst>
               <a:ext uri="{91240B29-F687-4f45-9708-019B960494DF}">
-                <a14:hiddenLine xmlns="" xmlns:a14="http://schemas.microsoft.com/office/drawing/2010/main" w="9525">
+                <a14:hiddenLine xmlns:a14="http://schemas.microsoft.com/office/drawing/2010/main" xmlns="" w="9525">
                   <a:solidFill>
                     <a:srgbClr val="000000"/>
                   </a:solidFill>
@@ -1127,7 +1128,7 @@
             </a:ln>
             <a:extLst>
               <a:ext uri="{91240B29-F687-4f45-9708-019B960494DF}">
-                <a14:hiddenLine xmlns="" xmlns:a14="http://schemas.microsoft.com/office/drawing/2010/main" w="9525">
+                <a14:hiddenLine xmlns:a14="http://schemas.microsoft.com/office/drawing/2010/main" xmlns="" w="9525">
                   <a:solidFill>
                     <a:srgbClr val="000000"/>
                   </a:solidFill>
@@ -1237,7 +1238,7 @@
             </a:ln>
             <a:extLst>
               <a:ext uri="{91240B29-F687-4f45-9708-019B960494DF}">
-                <a14:hiddenLine xmlns="" xmlns:a14="http://schemas.microsoft.com/office/drawing/2010/main" w="9525">
+                <a14:hiddenLine xmlns:a14="http://schemas.microsoft.com/office/drawing/2010/main" xmlns="" w="9525">
                   <a:solidFill>
                     <a:srgbClr val="000000"/>
                   </a:solidFill>
@@ -1299,7 +1300,7 @@
             </a:ln>
             <a:extLst>
               <a:ext uri="{91240B29-F687-4f45-9708-019B960494DF}">
-                <a14:hiddenLine xmlns="" xmlns:a14="http://schemas.microsoft.com/office/drawing/2010/main" w="9525">
+                <a14:hiddenLine xmlns:a14="http://schemas.microsoft.com/office/drawing/2010/main" xmlns="" w="9525">
                   <a:solidFill>
                     <a:srgbClr val="000000"/>
                   </a:solidFill>
@@ -1389,7 +1390,7 @@
             </a:ln>
             <a:extLst>
               <a:ext uri="{91240B29-F687-4f45-9708-019B960494DF}">
-                <a14:hiddenLine xmlns="" xmlns:a14="http://schemas.microsoft.com/office/drawing/2010/main" w="9525">
+                <a14:hiddenLine xmlns:a14="http://schemas.microsoft.com/office/drawing/2010/main" xmlns="" w="9525">
                   <a:solidFill>
                     <a:srgbClr val="000000"/>
                   </a:solidFill>
@@ -1479,7 +1480,7 @@
             </a:ln>
             <a:extLst>
               <a:ext uri="{91240B29-F687-4f45-9708-019B960494DF}">
-                <a14:hiddenLine xmlns="" xmlns:a14="http://schemas.microsoft.com/office/drawing/2010/main" w="9525">
+                <a14:hiddenLine xmlns:a14="http://schemas.microsoft.com/office/drawing/2010/main" xmlns="" w="9525">
                   <a:solidFill>
                     <a:srgbClr val="000000"/>
                   </a:solidFill>
@@ -1541,7 +1542,7 @@
             </a:ln>
             <a:extLst>
               <a:ext uri="{91240B29-F687-4f45-9708-019B960494DF}">
-                <a14:hiddenLine xmlns="" xmlns:a14="http://schemas.microsoft.com/office/drawing/2010/main" w="9525">
+                <a14:hiddenLine xmlns:a14="http://schemas.microsoft.com/office/drawing/2010/main" xmlns="" w="9525">
                   <a:solidFill>
                     <a:srgbClr val="000000"/>
                   </a:solidFill>
@@ -1631,7 +1632,7 @@
             </a:ln>
             <a:extLst>
               <a:ext uri="{91240B29-F687-4f45-9708-019B960494DF}">
-                <a14:hiddenLine xmlns="" xmlns:a14="http://schemas.microsoft.com/office/drawing/2010/main" w="9525">
+                <a14:hiddenLine xmlns:a14="http://schemas.microsoft.com/office/drawing/2010/main" xmlns="" w="9525">
                   <a:solidFill>
                     <a:srgbClr val="000000"/>
                   </a:solidFill>
@@ -1721,7 +1722,7 @@
             </a:ln>
             <a:extLst>
               <a:ext uri="{91240B29-F687-4f45-9708-019B960494DF}">
-                <a14:hiddenLine xmlns="" xmlns:a14="http://schemas.microsoft.com/office/drawing/2010/main" w="9525">
+                <a14:hiddenLine xmlns:a14="http://schemas.microsoft.com/office/drawing/2010/main" xmlns="" w="9525">
                   <a:solidFill>
                     <a:srgbClr val="000000"/>
                   </a:solidFill>
@@ -1777,7 +1778,7 @@
             </a:ln>
             <a:extLst>
               <a:ext uri="{91240B29-F687-4f45-9708-019B960494DF}">
-                <a14:hiddenLine xmlns="" xmlns:a14="http://schemas.microsoft.com/office/drawing/2010/main" w="9525">
+                <a14:hiddenLine xmlns:a14="http://schemas.microsoft.com/office/drawing/2010/main" xmlns="" w="9525">
                   <a:solidFill>
                     <a:srgbClr val="000000"/>
                   </a:solidFill>
@@ -1867,7 +1868,7 @@
             </a:ln>
             <a:extLst>
               <a:ext uri="{91240B29-F687-4f45-9708-019B960494DF}">
-                <a14:hiddenLine xmlns="" xmlns:a14="http://schemas.microsoft.com/office/drawing/2010/main" w="9525">
+                <a14:hiddenLine xmlns:a14="http://schemas.microsoft.com/office/drawing/2010/main" xmlns="" w="9525">
                   <a:solidFill>
                     <a:srgbClr val="000000"/>
                   </a:solidFill>
@@ -1923,7 +1924,7 @@
             </a:ln>
             <a:extLst>
               <a:ext uri="{91240B29-F687-4f45-9708-019B960494DF}">
-                <a14:hiddenLine xmlns="" xmlns:a14="http://schemas.microsoft.com/office/drawing/2010/main" w="9525">
+                <a14:hiddenLine xmlns:a14="http://schemas.microsoft.com/office/drawing/2010/main" xmlns="" w="9525">
                   <a:solidFill>
                     <a:srgbClr val="000000"/>
                   </a:solidFill>
@@ -2013,7 +2014,7 @@
             </a:ln>
             <a:extLst>
               <a:ext uri="{91240B29-F687-4f45-9708-019B960494DF}">
-                <a14:hiddenLine xmlns="" xmlns:a14="http://schemas.microsoft.com/office/drawing/2010/main" w="9525">
+                <a14:hiddenLine xmlns:a14="http://schemas.microsoft.com/office/drawing/2010/main" xmlns="" w="9525">
                   <a:solidFill>
                     <a:srgbClr val="000000"/>
                   </a:solidFill>
@@ -2081,7 +2082,7 @@
             </a:ln>
             <a:extLst>
               <a:ext uri="{91240B29-F687-4f45-9708-019B960494DF}">
-                <a14:hiddenLine xmlns="" xmlns:a14="http://schemas.microsoft.com/office/drawing/2010/main" w="9525">
+                <a14:hiddenLine xmlns:a14="http://schemas.microsoft.com/office/drawing/2010/main" xmlns="" w="9525">
                   <a:solidFill>
                     <a:srgbClr val="000000"/>
                   </a:solidFill>
@@ -2171,7 +2172,7 @@
             </a:ln>
             <a:extLst>
               <a:ext uri="{91240B29-F687-4f45-9708-019B960494DF}">
-                <a14:hiddenLine xmlns="" xmlns:a14="http://schemas.microsoft.com/office/drawing/2010/main" w="9525">
+                <a14:hiddenLine xmlns:a14="http://schemas.microsoft.com/office/drawing/2010/main" xmlns="" w="9525">
                   <a:solidFill>
                     <a:srgbClr val="000000"/>
                   </a:solidFill>
@@ -2239,7 +2240,7 @@
             </a:ln>
             <a:extLst>
               <a:ext uri="{91240B29-F687-4f45-9708-019B960494DF}">
-                <a14:hiddenLine xmlns="" xmlns:a14="http://schemas.microsoft.com/office/drawing/2010/main" w="9525">
+                <a14:hiddenLine xmlns:a14="http://schemas.microsoft.com/office/drawing/2010/main" xmlns="" w="9525">
                   <a:solidFill>
                     <a:srgbClr val="000000"/>
                   </a:solidFill>
@@ -2329,7 +2330,7 @@
             </a:ln>
             <a:extLst>
               <a:ext uri="{91240B29-F687-4f45-9708-019B960494DF}">
-                <a14:hiddenLine xmlns="" xmlns:a14="http://schemas.microsoft.com/office/drawing/2010/main" w="9525">
+                <a14:hiddenLine xmlns:a14="http://schemas.microsoft.com/office/drawing/2010/main" xmlns="" w="9525">
                   <a:solidFill>
                     <a:srgbClr val="000000"/>
                   </a:solidFill>
@@ -2363,7 +2364,7 @@
             </a:ln>
             <a:extLst>
               <a:ext uri="{91240B29-F687-4f45-9708-019B960494DF}">
-                <a14:hiddenLine xmlns="" xmlns:a14="http://schemas.microsoft.com/office/drawing/2010/main" w="9525">
+                <a14:hiddenLine xmlns:a14="http://schemas.microsoft.com/office/drawing/2010/main" xmlns="" w="9525">
                   <a:solidFill>
                     <a:srgbClr val="000000"/>
                   </a:solidFill>
@@ -2453,7 +2454,7 @@
             </a:ln>
             <a:extLst>
               <a:ext uri="{91240B29-F687-4f45-9708-019B960494DF}">
-                <a14:hiddenLine xmlns="" xmlns:a14="http://schemas.microsoft.com/office/drawing/2010/main" w="9525">
+                <a14:hiddenLine xmlns:a14="http://schemas.microsoft.com/office/drawing/2010/main" xmlns="" w="9525">
                   <a:solidFill>
                     <a:srgbClr val="000000"/>
                   </a:solidFill>
@@ -2515,7 +2516,7 @@
             </a:ln>
             <a:extLst>
               <a:ext uri="{91240B29-F687-4f45-9708-019B960494DF}">
-                <a14:hiddenLine xmlns="" xmlns:a14="http://schemas.microsoft.com/office/drawing/2010/main" w="9525">
+                <a14:hiddenLine xmlns:a14="http://schemas.microsoft.com/office/drawing/2010/main" xmlns="" w="9525">
                   <a:solidFill>
                     <a:srgbClr val="000000"/>
                   </a:solidFill>
@@ -2577,7 +2578,7 @@
             </a:ln>
             <a:extLst>
               <a:ext uri="{91240B29-F687-4f45-9708-019B960494DF}">
-                <a14:hiddenLine xmlns="" xmlns:a14="http://schemas.microsoft.com/office/drawing/2010/main" w="9525">
+                <a14:hiddenLine xmlns:a14="http://schemas.microsoft.com/office/drawing/2010/main" xmlns="" w="9525">
                   <a:solidFill>
                     <a:srgbClr val="000000"/>
                   </a:solidFill>
@@ -2667,7 +2668,7 @@
             </a:ln>
             <a:extLst>
               <a:ext uri="{91240B29-F687-4f45-9708-019B960494DF}">
-                <a14:hiddenLine xmlns="" xmlns:a14="http://schemas.microsoft.com/office/drawing/2010/main" w="9525">
+                <a14:hiddenLine xmlns:a14="http://schemas.microsoft.com/office/drawing/2010/main" xmlns="" w="9525">
                   <a:solidFill>
                     <a:srgbClr val="000000"/>
                   </a:solidFill>
@@ -2735,7 +2736,7 @@
             </a:ln>
             <a:extLst>
               <a:ext uri="{91240B29-F687-4f45-9708-019B960494DF}">
-                <a14:hiddenLine xmlns="" xmlns:a14="http://schemas.microsoft.com/office/drawing/2010/main" w="9525">
+                <a14:hiddenLine xmlns:a14="http://schemas.microsoft.com/office/drawing/2010/main" xmlns="" w="9525">
                   <a:solidFill>
                     <a:srgbClr val="000000"/>
                   </a:solidFill>
@@ -2797,7 +2798,7 @@
             </a:ln>
             <a:extLst>
               <a:ext uri="{91240B29-F687-4f45-9708-019B960494DF}">
-                <a14:hiddenLine xmlns="" xmlns:a14="http://schemas.microsoft.com/office/drawing/2010/main" w="9525">
+                <a14:hiddenLine xmlns:a14="http://schemas.microsoft.com/office/drawing/2010/main" xmlns="" w="9525">
                   <a:solidFill>
                     <a:srgbClr val="000000"/>
                   </a:solidFill>
@@ -2887,7 +2888,7 @@
             </a:ln>
             <a:extLst>
               <a:ext uri="{91240B29-F687-4f45-9708-019B960494DF}">
-                <a14:hiddenLine xmlns="" xmlns:a14="http://schemas.microsoft.com/office/drawing/2010/main" w="9525">
+                <a14:hiddenLine xmlns:a14="http://schemas.microsoft.com/office/drawing/2010/main" xmlns="" w="9525">
                   <a:solidFill>
                     <a:srgbClr val="000000"/>
                   </a:solidFill>
@@ -2949,7 +2950,7 @@
             </a:ln>
             <a:extLst>
               <a:ext uri="{91240B29-F687-4f45-9708-019B960494DF}">
-                <a14:hiddenLine xmlns="" xmlns:a14="http://schemas.microsoft.com/office/drawing/2010/main" w="9525">
+                <a14:hiddenLine xmlns:a14="http://schemas.microsoft.com/office/drawing/2010/main" xmlns="" w="9525">
                   <a:solidFill>
                     <a:srgbClr val="000000"/>
                   </a:solidFill>
@@ -3039,7 +3040,7 @@
             </a:ln>
             <a:extLst>
               <a:ext uri="{91240B29-F687-4f45-9708-019B960494DF}">
-                <a14:hiddenLine xmlns="" xmlns:a14="http://schemas.microsoft.com/office/drawing/2010/main" w="9525">
+                <a14:hiddenLine xmlns:a14="http://schemas.microsoft.com/office/drawing/2010/main" xmlns="" w="9525">
                   <a:solidFill>
                     <a:srgbClr val="000000"/>
                   </a:solidFill>
@@ -3101,7 +3102,7 @@
             </a:ln>
             <a:extLst>
               <a:ext uri="{91240B29-F687-4f45-9708-019B960494DF}">
-                <a14:hiddenLine xmlns="" xmlns:a14="http://schemas.microsoft.com/office/drawing/2010/main" w="9525">
+                <a14:hiddenLine xmlns:a14="http://schemas.microsoft.com/office/drawing/2010/main" xmlns="" w="9525">
                   <a:solidFill>
                     <a:srgbClr val="000000"/>
                   </a:solidFill>
@@ -3191,7 +3192,7 @@
             </a:ln>
             <a:extLst>
               <a:ext uri="{91240B29-F687-4f45-9708-019B960494DF}">
-                <a14:hiddenLine xmlns="" xmlns:a14="http://schemas.microsoft.com/office/drawing/2010/main" w="9525">
+                <a14:hiddenLine xmlns:a14="http://schemas.microsoft.com/office/drawing/2010/main" xmlns="" w="9525">
                   <a:solidFill>
                     <a:srgbClr val="000000"/>
                   </a:solidFill>
@@ -3225,7 +3226,7 @@
             </a:ln>
             <a:extLst>
               <a:ext uri="{91240B29-F687-4f45-9708-019B960494DF}">
-                <a14:hiddenLine xmlns="" xmlns:a14="http://schemas.microsoft.com/office/drawing/2010/main" w="9525">
+                <a14:hiddenLine xmlns:a14="http://schemas.microsoft.com/office/drawing/2010/main" xmlns="" w="9525">
                   <a:solidFill>
                     <a:srgbClr val="000000"/>
                   </a:solidFill>
@@ -3290,7 +3291,7 @@
             </a:ln>
             <a:extLst>
               <a:ext uri="{91240B29-F687-4f45-9708-019B960494DF}">
-                <a14:hiddenLine xmlns="" xmlns:a14="http://schemas.microsoft.com/office/drawing/2010/main" w="9525">
+                <a14:hiddenLine xmlns:a14="http://schemas.microsoft.com/office/drawing/2010/main" xmlns="" w="9525">
                   <a:solidFill>
                     <a:srgbClr val="000000"/>
                   </a:solidFill>
@@ -3380,7 +3381,7 @@
             </a:ln>
             <a:extLst>
               <a:ext uri="{91240B29-F687-4f45-9708-019B960494DF}">
-                <a14:hiddenLine xmlns="" xmlns:a14="http://schemas.microsoft.com/office/drawing/2010/main" w="9525">
+                <a14:hiddenLine xmlns:a14="http://schemas.microsoft.com/office/drawing/2010/main" xmlns="" w="9525">
                   <a:solidFill>
                     <a:srgbClr val="000000"/>
                   </a:solidFill>
@@ -3442,7 +3443,7 @@
             </a:ln>
             <a:extLst>
               <a:ext uri="{91240B29-F687-4f45-9708-019B960494DF}">
-                <a14:hiddenLine xmlns="" xmlns:a14="http://schemas.microsoft.com/office/drawing/2010/main" w="9525">
+                <a14:hiddenLine xmlns:a14="http://schemas.microsoft.com/office/drawing/2010/main" xmlns="" w="9525">
                   <a:solidFill>
                     <a:srgbClr val="000000"/>
                   </a:solidFill>
@@ -3532,7 +3533,7 @@
             </a:ln>
             <a:extLst>
               <a:ext uri="{91240B29-F687-4f45-9708-019B960494DF}">
-                <a14:hiddenLine xmlns="" xmlns:a14="http://schemas.microsoft.com/office/drawing/2010/main" w="9525">
+                <a14:hiddenLine xmlns:a14="http://schemas.microsoft.com/office/drawing/2010/main" xmlns="" w="9525">
                   <a:solidFill>
                     <a:srgbClr val="000000"/>
                   </a:solidFill>
@@ -3622,7 +3623,7 @@
             </a:ln>
             <a:extLst>
               <a:ext uri="{91240B29-F687-4f45-9708-019B960494DF}">
-                <a14:hiddenLine xmlns="" xmlns:a14="http://schemas.microsoft.com/office/drawing/2010/main" w="9525">
+                <a14:hiddenLine xmlns:a14="http://schemas.microsoft.com/office/drawing/2010/main" xmlns="" w="9525">
                   <a:solidFill>
                     <a:srgbClr val="000000"/>
                   </a:solidFill>
@@ -3687,7 +3688,7 @@
             </a:ln>
             <a:extLst>
               <a:ext uri="{91240B29-F687-4f45-9708-019B960494DF}">
-                <a14:hiddenLine xmlns="" xmlns:a14="http://schemas.microsoft.com/office/drawing/2010/main" w="9525">
+                <a14:hiddenLine xmlns:a14="http://schemas.microsoft.com/office/drawing/2010/main" xmlns="" w="9525">
                   <a:solidFill>
                     <a:srgbClr val="000000"/>
                   </a:solidFill>
@@ -3749,7 +3750,7 @@
             </a:ln>
             <a:extLst>
               <a:ext uri="{91240B29-F687-4f45-9708-019B960494DF}">
-                <a14:hiddenLine xmlns="" xmlns:a14="http://schemas.microsoft.com/office/drawing/2010/main" w="9525">
+                <a14:hiddenLine xmlns:a14="http://schemas.microsoft.com/office/drawing/2010/main" xmlns="" w="9525">
                   <a:solidFill>
                     <a:srgbClr val="000000"/>
                   </a:solidFill>
@@ -3839,7 +3840,7 @@
             </a:ln>
             <a:extLst>
               <a:ext uri="{91240B29-F687-4f45-9708-019B960494DF}">
-                <a14:hiddenLine xmlns="" xmlns:a14="http://schemas.microsoft.com/office/drawing/2010/main" w="9525">
+                <a14:hiddenLine xmlns:a14="http://schemas.microsoft.com/office/drawing/2010/main" xmlns="" w="9525">
                   <a:solidFill>
                     <a:srgbClr val="000000"/>
                   </a:solidFill>
@@ -3929,7 +3930,7 @@
             </a:ln>
             <a:extLst>
               <a:ext uri="{91240B29-F687-4f45-9708-019B960494DF}">
-                <a14:hiddenLine xmlns="" xmlns:a14="http://schemas.microsoft.com/office/drawing/2010/main" w="9525">
+                <a14:hiddenLine xmlns:a14="http://schemas.microsoft.com/office/drawing/2010/main" xmlns="" w="9525">
                   <a:solidFill>
                     <a:srgbClr val="000000"/>
                   </a:solidFill>
@@ -3991,7 +3992,7 @@
             </a:ln>
             <a:extLst>
               <a:ext uri="{91240B29-F687-4f45-9708-019B960494DF}">
-                <a14:hiddenLine xmlns="" xmlns:a14="http://schemas.microsoft.com/office/drawing/2010/main" w="9525">
+                <a14:hiddenLine xmlns:a14="http://schemas.microsoft.com/office/drawing/2010/main" xmlns="" w="9525">
                   <a:solidFill>
                     <a:srgbClr val="000000"/>
                   </a:solidFill>
@@ -4111,7 +4112,7 @@
             </a:ln>
             <a:extLst>
               <a:ext uri="{91240B29-F687-4f45-9708-019B960494DF}">
-                <a14:hiddenLine xmlns="" xmlns:a14="http://schemas.microsoft.com/office/drawing/2010/main" w="9525">
+                <a14:hiddenLine xmlns:a14="http://schemas.microsoft.com/office/drawing/2010/main" xmlns="" w="9525">
                   <a:solidFill>
                     <a:srgbClr val="000000"/>
                   </a:solidFill>
@@ -4179,7 +4180,7 @@
             </a:ln>
             <a:extLst>
               <a:ext uri="{91240B29-F687-4f45-9708-019B960494DF}">
-                <a14:hiddenLine xmlns="" xmlns:a14="http://schemas.microsoft.com/office/drawing/2010/main" w="9525">
+                <a14:hiddenLine xmlns:a14="http://schemas.microsoft.com/office/drawing/2010/main" xmlns="" w="9525">
                   <a:solidFill>
                     <a:srgbClr val="000000"/>
                   </a:solidFill>
@@ -4269,7 +4270,7 @@
             </a:ln>
             <a:extLst>
               <a:ext uri="{91240B29-F687-4f45-9708-019B960494DF}">
-                <a14:hiddenLine xmlns="" xmlns:a14="http://schemas.microsoft.com/office/drawing/2010/main" w="9525">
+                <a14:hiddenLine xmlns:a14="http://schemas.microsoft.com/office/drawing/2010/main" xmlns="" w="9525">
                   <a:solidFill>
                     <a:srgbClr val="000000"/>
                   </a:solidFill>
@@ -8998,7 +8999,7 @@
           <a:noFill/>
           <a:extLst>
             <a:ext uri="{909E8E84-426E-40dd-AFC4-6F175D3DCCD1}">
-              <a14:hiddenFill xmlns="" xmlns:a14="http://schemas.microsoft.com/office/drawing/2010/main">
+              <a14:hiddenFill xmlns:a14="http://schemas.microsoft.com/office/drawing/2010/main" xmlns="">
                 <a:solidFill>
                   <a:srgbClr val="FFFFFF"/>
                 </a:solidFill>
@@ -9072,7 +9073,7 @@
               </a:ln>
               <a:extLst>
                 <a:ext uri="{91240B29-F687-4f45-9708-019B960494DF}">
-                  <a14:hiddenLine xmlns="" xmlns:a14="http://schemas.microsoft.com/office/drawing/2010/main" w="9525">
+                  <a14:hiddenLine xmlns:a14="http://schemas.microsoft.com/office/drawing/2010/main" xmlns="" w="9525">
                     <a:solidFill>
                       <a:srgbClr val="000000"/>
                     </a:solidFill>
@@ -9162,7 +9163,7 @@
               </a:ln>
               <a:extLst>
                 <a:ext uri="{91240B29-F687-4f45-9708-019B960494DF}">
-                  <a14:hiddenLine xmlns="" xmlns:a14="http://schemas.microsoft.com/office/drawing/2010/main" w="9525">
+                  <a14:hiddenLine xmlns:a14="http://schemas.microsoft.com/office/drawing/2010/main" xmlns="" w="9525">
                     <a:solidFill>
                       <a:srgbClr val="000000"/>
                     </a:solidFill>
@@ -9252,7 +9253,7 @@
               </a:ln>
               <a:extLst>
                 <a:ext uri="{91240B29-F687-4f45-9708-019B960494DF}">
-                  <a14:hiddenLine xmlns="" xmlns:a14="http://schemas.microsoft.com/office/drawing/2010/main" w="9525">
+                  <a14:hiddenLine xmlns:a14="http://schemas.microsoft.com/office/drawing/2010/main" xmlns="" w="9525">
                     <a:solidFill>
                       <a:srgbClr val="000000"/>
                     </a:solidFill>
@@ -9314,7 +9315,7 @@
               </a:ln>
               <a:extLst>
                 <a:ext uri="{91240B29-F687-4f45-9708-019B960494DF}">
-                  <a14:hiddenLine xmlns="" xmlns:a14="http://schemas.microsoft.com/office/drawing/2010/main" w="9525">
+                  <a14:hiddenLine xmlns:a14="http://schemas.microsoft.com/office/drawing/2010/main" xmlns="" w="9525">
                     <a:solidFill>
                       <a:srgbClr val="000000"/>
                     </a:solidFill>
@@ -9404,7 +9405,7 @@
               </a:ln>
               <a:extLst>
                 <a:ext uri="{91240B29-F687-4f45-9708-019B960494DF}">
-                  <a14:hiddenLine xmlns="" xmlns:a14="http://schemas.microsoft.com/office/drawing/2010/main" w="9525">
+                  <a14:hiddenLine xmlns:a14="http://schemas.microsoft.com/office/drawing/2010/main" xmlns="" w="9525">
                     <a:solidFill>
                       <a:srgbClr val="000000"/>
                     </a:solidFill>
@@ -9466,7 +9467,7 @@
               </a:ln>
               <a:extLst>
                 <a:ext uri="{91240B29-F687-4f45-9708-019B960494DF}">
-                  <a14:hiddenLine xmlns="" xmlns:a14="http://schemas.microsoft.com/office/drawing/2010/main" w="9525">
+                  <a14:hiddenLine xmlns:a14="http://schemas.microsoft.com/office/drawing/2010/main" xmlns="" w="9525">
                     <a:solidFill>
                       <a:srgbClr val="000000"/>
                     </a:solidFill>
@@ -9528,7 +9529,7 @@
               </a:ln>
               <a:extLst>
                 <a:ext uri="{91240B29-F687-4f45-9708-019B960494DF}">
-                  <a14:hiddenLine xmlns="" xmlns:a14="http://schemas.microsoft.com/office/drawing/2010/main" w="9525">
+                  <a14:hiddenLine xmlns:a14="http://schemas.microsoft.com/office/drawing/2010/main" xmlns="" w="9525">
                     <a:solidFill>
                       <a:srgbClr val="000000"/>
                     </a:solidFill>
@@ -9618,7 +9619,7 @@
               </a:ln>
               <a:extLst>
                 <a:ext uri="{91240B29-F687-4f45-9708-019B960494DF}">
-                  <a14:hiddenLine xmlns="" xmlns:a14="http://schemas.microsoft.com/office/drawing/2010/main" w="9525">
+                  <a14:hiddenLine xmlns:a14="http://schemas.microsoft.com/office/drawing/2010/main" xmlns="" w="9525">
                     <a:solidFill>
                       <a:srgbClr val="000000"/>
                     </a:solidFill>
@@ -9708,7 +9709,7 @@
               </a:ln>
               <a:extLst>
                 <a:ext uri="{91240B29-F687-4f45-9708-019B960494DF}">
-                  <a14:hiddenLine xmlns="" xmlns:a14="http://schemas.microsoft.com/office/drawing/2010/main" w="9525">
+                  <a14:hiddenLine xmlns:a14="http://schemas.microsoft.com/office/drawing/2010/main" xmlns="" w="9525">
                     <a:solidFill>
                       <a:srgbClr val="000000"/>
                     </a:solidFill>
@@ -9770,7 +9771,7 @@
               </a:ln>
               <a:extLst>
                 <a:ext uri="{91240B29-F687-4f45-9708-019B960494DF}">
-                  <a14:hiddenLine xmlns="" xmlns:a14="http://schemas.microsoft.com/office/drawing/2010/main" w="9525">
+                  <a14:hiddenLine xmlns:a14="http://schemas.microsoft.com/office/drawing/2010/main" xmlns="" w="9525">
                     <a:solidFill>
                       <a:srgbClr val="000000"/>
                     </a:solidFill>
@@ -9880,7 +9881,7 @@
               </a:ln>
               <a:extLst>
                 <a:ext uri="{91240B29-F687-4f45-9708-019B960494DF}">
-                  <a14:hiddenLine xmlns="" xmlns:a14="http://schemas.microsoft.com/office/drawing/2010/main" w="9525">
+                  <a14:hiddenLine xmlns:a14="http://schemas.microsoft.com/office/drawing/2010/main" xmlns="" w="9525">
                     <a:solidFill>
                       <a:srgbClr val="000000"/>
                     </a:solidFill>
@@ -9964,7 +9965,7 @@
               </a:ln>
               <a:extLst>
                 <a:ext uri="{91240B29-F687-4f45-9708-019B960494DF}">
-                  <a14:hiddenLine xmlns="" xmlns:a14="http://schemas.microsoft.com/office/drawing/2010/main" w="9525">
+                  <a14:hiddenLine xmlns:a14="http://schemas.microsoft.com/office/drawing/2010/main" xmlns="" w="9525">
                     <a:solidFill>
                       <a:srgbClr val="000000"/>
                     </a:solidFill>
@@ -10026,7 +10027,7 @@
               </a:ln>
               <a:extLst>
                 <a:ext uri="{91240B29-F687-4f45-9708-019B960494DF}">
-                  <a14:hiddenLine xmlns="" xmlns:a14="http://schemas.microsoft.com/office/drawing/2010/main" w="9525">
+                  <a14:hiddenLine xmlns:a14="http://schemas.microsoft.com/office/drawing/2010/main" xmlns="" w="9525">
                     <a:solidFill>
                       <a:srgbClr val="000000"/>
                     </a:solidFill>
@@ -10088,7 +10089,7 @@
               </a:ln>
               <a:extLst>
                 <a:ext uri="{91240B29-F687-4f45-9708-019B960494DF}">
-                  <a14:hiddenLine xmlns="" xmlns:a14="http://schemas.microsoft.com/office/drawing/2010/main" w="9525">
+                  <a14:hiddenLine xmlns:a14="http://schemas.microsoft.com/office/drawing/2010/main" xmlns="" w="9525">
                     <a:solidFill>
                       <a:srgbClr val="000000"/>
                     </a:solidFill>
@@ -10178,7 +10179,7 @@
               </a:ln>
               <a:extLst>
                 <a:ext uri="{91240B29-F687-4f45-9708-019B960494DF}">
-                  <a14:hiddenLine xmlns="" xmlns:a14="http://schemas.microsoft.com/office/drawing/2010/main" w="9525">
+                  <a14:hiddenLine xmlns:a14="http://schemas.microsoft.com/office/drawing/2010/main" xmlns="" w="9525">
                     <a:solidFill>
                       <a:srgbClr val="000000"/>
                     </a:solidFill>
@@ -10212,7 +10213,7 @@
               </a:ln>
               <a:extLst>
                 <a:ext uri="{91240B29-F687-4f45-9708-019B960494DF}">
-                  <a14:hiddenLine xmlns="" xmlns:a14="http://schemas.microsoft.com/office/drawing/2010/main" w="9525">
+                  <a14:hiddenLine xmlns:a14="http://schemas.microsoft.com/office/drawing/2010/main" xmlns="" w="9525">
                     <a:solidFill>
                       <a:srgbClr val="000000"/>
                     </a:solidFill>
@@ -10277,7 +10278,7 @@
               </a:ln>
               <a:extLst>
                 <a:ext uri="{91240B29-F687-4f45-9708-019B960494DF}">
-                  <a14:hiddenLine xmlns="" xmlns:a14="http://schemas.microsoft.com/office/drawing/2010/main" w="9525">
+                  <a14:hiddenLine xmlns:a14="http://schemas.microsoft.com/office/drawing/2010/main" xmlns="" w="9525">
                     <a:solidFill>
                       <a:srgbClr val="000000"/>
                     </a:solidFill>
@@ -10367,7 +10368,7 @@
               </a:ln>
               <a:extLst>
                 <a:ext uri="{91240B29-F687-4f45-9708-019B960494DF}">
-                  <a14:hiddenLine xmlns="" xmlns:a14="http://schemas.microsoft.com/office/drawing/2010/main" w="9525">
+                  <a14:hiddenLine xmlns:a14="http://schemas.microsoft.com/office/drawing/2010/main" xmlns="" w="9525">
                     <a:solidFill>
                       <a:srgbClr val="000000"/>
                     </a:solidFill>
@@ -10429,7 +10430,7 @@
               </a:ln>
               <a:extLst>
                 <a:ext uri="{91240B29-F687-4f45-9708-019B960494DF}">
-                  <a14:hiddenLine xmlns="" xmlns:a14="http://schemas.microsoft.com/office/drawing/2010/main" w="9525">
+                  <a14:hiddenLine xmlns:a14="http://schemas.microsoft.com/office/drawing/2010/main" xmlns="" w="9525">
                     <a:solidFill>
                       <a:srgbClr val="000000"/>
                     </a:solidFill>
@@ -10519,7 +10520,7 @@
               </a:ln>
               <a:extLst>
                 <a:ext uri="{91240B29-F687-4f45-9708-019B960494DF}">
-                  <a14:hiddenLine xmlns="" xmlns:a14="http://schemas.microsoft.com/office/drawing/2010/main" w="9525">
+                  <a14:hiddenLine xmlns:a14="http://schemas.microsoft.com/office/drawing/2010/main" xmlns="" w="9525">
                     <a:solidFill>
                       <a:srgbClr val="000000"/>
                     </a:solidFill>
@@ -10584,7 +10585,7 @@
               </a:ln>
               <a:extLst>
                 <a:ext uri="{91240B29-F687-4f45-9708-019B960494DF}">
-                  <a14:hiddenLine xmlns="" xmlns:a14="http://schemas.microsoft.com/office/drawing/2010/main" w="9525">
+                  <a14:hiddenLine xmlns:a14="http://schemas.microsoft.com/office/drawing/2010/main" xmlns="" w="9525">
                     <a:solidFill>
                       <a:srgbClr val="000000"/>
                     </a:solidFill>
@@ -10646,7 +10647,7 @@
               </a:ln>
               <a:extLst>
                 <a:ext uri="{91240B29-F687-4f45-9708-019B960494DF}">
-                  <a14:hiddenLine xmlns="" xmlns:a14="http://schemas.microsoft.com/office/drawing/2010/main" w="9525">
+                  <a14:hiddenLine xmlns:a14="http://schemas.microsoft.com/office/drawing/2010/main" xmlns="" w="9525">
                     <a:solidFill>
                       <a:srgbClr val="000000"/>
                     </a:solidFill>
@@ -10736,7 +10737,7 @@
               </a:ln>
               <a:extLst>
                 <a:ext uri="{91240B29-F687-4f45-9708-019B960494DF}">
-                  <a14:hiddenLine xmlns="" xmlns:a14="http://schemas.microsoft.com/office/drawing/2010/main" w="9525">
+                  <a14:hiddenLine xmlns:a14="http://schemas.microsoft.com/office/drawing/2010/main" xmlns="" w="9525">
                     <a:solidFill>
                       <a:srgbClr val="000000"/>
                     </a:solidFill>
@@ -10826,7 +10827,7 @@
               </a:ln>
               <a:extLst>
                 <a:ext uri="{91240B29-F687-4f45-9708-019B960494DF}">
-                  <a14:hiddenLine xmlns="" xmlns:a14="http://schemas.microsoft.com/office/drawing/2010/main" w="9525">
+                  <a14:hiddenLine xmlns:a14="http://schemas.microsoft.com/office/drawing/2010/main" xmlns="" w="9525">
                     <a:solidFill>
                       <a:srgbClr val="000000"/>
                     </a:solidFill>
@@ -10891,7 +10892,7 @@
               </a:ln>
               <a:extLst>
                 <a:ext uri="{91240B29-F687-4f45-9708-019B960494DF}">
-                  <a14:hiddenLine xmlns="" xmlns:a14="http://schemas.microsoft.com/office/drawing/2010/main" w="9525">
+                  <a14:hiddenLine xmlns:a14="http://schemas.microsoft.com/office/drawing/2010/main" xmlns="" w="9525">
                     <a:solidFill>
                       <a:srgbClr val="000000"/>
                     </a:solidFill>
@@ -11011,7 +11012,7 @@
               </a:ln>
               <a:extLst>
                 <a:ext uri="{91240B29-F687-4f45-9708-019B960494DF}">
-                  <a14:hiddenLine xmlns="" xmlns:a14="http://schemas.microsoft.com/office/drawing/2010/main" w="9525">
+                  <a14:hiddenLine xmlns:a14="http://schemas.microsoft.com/office/drawing/2010/main" xmlns="" w="9525">
                     <a:solidFill>
                       <a:srgbClr val="000000"/>
                     </a:solidFill>
@@ -11092,7 +11093,7 @@
               </a:ln>
               <a:extLst>
                 <a:ext uri="{91240B29-F687-4f45-9708-019B960494DF}">
-                  <a14:hiddenLine xmlns="" xmlns:a14="http://schemas.microsoft.com/office/drawing/2010/main" w="9525">
+                  <a14:hiddenLine xmlns:a14="http://schemas.microsoft.com/office/drawing/2010/main" xmlns="" w="9525">
                     <a:solidFill>
                       <a:srgbClr val="000000"/>
                     </a:solidFill>
@@ -11207,7 +11208,7 @@
               </a:ln>
               <a:extLst>
                 <a:ext uri="{91240B29-F687-4f45-9708-019B960494DF}">
-                  <a14:hiddenLine xmlns="" xmlns:a14="http://schemas.microsoft.com/office/drawing/2010/main" w="9525">
+                  <a14:hiddenLine xmlns:a14="http://schemas.microsoft.com/office/drawing/2010/main" xmlns="" w="9525">
                     <a:solidFill>
                       <a:srgbClr val="000000"/>
                     </a:solidFill>
@@ -11297,7 +11298,7 @@
               </a:ln>
               <a:extLst>
                 <a:ext uri="{91240B29-F687-4f45-9708-019B960494DF}">
-                  <a14:hiddenLine xmlns="" xmlns:a14="http://schemas.microsoft.com/office/drawing/2010/main" w="9525">
+                  <a14:hiddenLine xmlns:a14="http://schemas.microsoft.com/office/drawing/2010/main" xmlns="" w="9525">
                     <a:solidFill>
                       <a:srgbClr val="000000"/>
                     </a:solidFill>
@@ -11362,7 +11363,7 @@
               </a:ln>
               <a:extLst>
                 <a:ext uri="{91240B29-F687-4f45-9708-019B960494DF}">
-                  <a14:hiddenLine xmlns="" xmlns:a14="http://schemas.microsoft.com/office/drawing/2010/main" w="9525">
+                  <a14:hiddenLine xmlns:a14="http://schemas.microsoft.com/office/drawing/2010/main" xmlns="" w="9525">
                     <a:solidFill>
                       <a:srgbClr val="000000"/>
                     </a:solidFill>
@@ -11452,7 +11453,7 @@
               </a:ln>
               <a:extLst>
                 <a:ext uri="{91240B29-F687-4f45-9708-019B960494DF}">
-                  <a14:hiddenLine xmlns="" xmlns:a14="http://schemas.microsoft.com/office/drawing/2010/main" w="9525">
+                  <a14:hiddenLine xmlns:a14="http://schemas.microsoft.com/office/drawing/2010/main" xmlns="" w="9525">
                     <a:solidFill>
                       <a:srgbClr val="000000"/>
                     </a:solidFill>
@@ -11520,7 +11521,7 @@
               </a:ln>
               <a:extLst>
                 <a:ext uri="{91240B29-F687-4f45-9708-019B960494DF}">
-                  <a14:hiddenLine xmlns="" xmlns:a14="http://schemas.microsoft.com/office/drawing/2010/main" w="9525">
+                  <a14:hiddenLine xmlns:a14="http://schemas.microsoft.com/office/drawing/2010/main" xmlns="" w="9525">
                     <a:solidFill>
                       <a:srgbClr val="000000"/>
                     </a:solidFill>
@@ -11610,7 +11611,7 @@
               </a:ln>
               <a:extLst>
                 <a:ext uri="{91240B29-F687-4f45-9708-019B960494DF}">
-                  <a14:hiddenLine xmlns="" xmlns:a14="http://schemas.microsoft.com/office/drawing/2010/main" w="9525">
+                  <a14:hiddenLine xmlns:a14="http://schemas.microsoft.com/office/drawing/2010/main" xmlns="" w="9525">
                     <a:solidFill>
                       <a:srgbClr val="000000"/>
                     </a:solidFill>
@@ -11678,7 +11679,7 @@
               </a:ln>
               <a:extLst>
                 <a:ext uri="{91240B29-F687-4f45-9708-019B960494DF}">
-                  <a14:hiddenLine xmlns="" xmlns:a14="http://schemas.microsoft.com/office/drawing/2010/main" w="9525">
+                  <a14:hiddenLine xmlns:a14="http://schemas.microsoft.com/office/drawing/2010/main" xmlns="" w="9525">
                     <a:solidFill>
                       <a:srgbClr val="000000"/>
                     </a:solidFill>
@@ -11768,7 +11769,7 @@
               </a:ln>
               <a:extLst>
                 <a:ext uri="{91240B29-F687-4f45-9708-019B960494DF}">
-                  <a14:hiddenLine xmlns="" xmlns:a14="http://schemas.microsoft.com/office/drawing/2010/main" w="9525">
+                  <a14:hiddenLine xmlns:a14="http://schemas.microsoft.com/office/drawing/2010/main" xmlns="" w="9525">
                     <a:solidFill>
                       <a:srgbClr val="000000"/>
                     </a:solidFill>
@@ -11802,7 +11803,7 @@
               </a:ln>
               <a:extLst>
                 <a:ext uri="{91240B29-F687-4f45-9708-019B960494DF}">
-                  <a14:hiddenLine xmlns="" xmlns:a14="http://schemas.microsoft.com/office/drawing/2010/main" w="9525">
+                  <a14:hiddenLine xmlns:a14="http://schemas.microsoft.com/office/drawing/2010/main" xmlns="" w="9525">
                     <a:solidFill>
                       <a:srgbClr val="000000"/>
                     </a:solidFill>
@@ -12425,6 +12426,14 @@
   <p:clrMapOvr>
     <a:masterClrMapping/>
   </p:clrMapOvr>
+  <mc:AlternateContent xmlns:mc="http://schemas.openxmlformats.org/markup-compatibility/2006">
+    <mc:Choice xmlns:p14="http://schemas.microsoft.com/office/powerpoint/2010/main" Requires="p14">
+      <p:transition spd="slow" p14:dur="2000" advTm="3092"/>
+    </mc:Choice>
+    <mc:Fallback>
+      <p:transition spd="slow" advTm="3092"/>
+    </mc:Fallback>
+  </mc:AlternateContent>
 </p:sld>
 </file>
 
@@ -12590,7 +12599,7 @@
         <p:spPr/>
         <p:txBody>
           <a:bodyPr>
-            <a:normAutofit fontScale="85000" lnSpcReduction="20000"/>
+            <a:normAutofit fontScale="70000" lnSpcReduction="20000"/>
           </a:bodyPr>
           <a:lstStyle/>
           <a:p>
@@ -12652,7 +12661,7 @@
         </p:spPr>
         <p:txBody>
           <a:bodyPr>
-            <a:normAutofit fontScale="85000" lnSpcReduction="20000"/>
+            <a:normAutofit fontScale="70000" lnSpcReduction="20000"/>
           </a:bodyPr>
           <a:lstStyle/>
           <a:p>
@@ -12683,6 +12692,20 @@
             <a:r>
               <a:rPr lang="en-GB" dirty="0"/>
               <a:t>2013 – IBM DB2 10.5 (XML)</a:t>
+            </a:r>
+          </a:p>
+          <a:p>
+            <a:r>
+              <a:rPr lang="en-GB" dirty="0"/>
+              <a:t>2014 – SQL Server (</a:t>
+            </a:r>
+            <a:r>
+              <a:rPr lang="en-GB" dirty="0" err="1"/>
+              <a:t>Hekaton</a:t>
+            </a:r>
+            <a:r>
+              <a:rPr lang="en-GB" dirty="0"/>
+              <a:t>)</a:t>
             </a:r>
           </a:p>
           <a:p>
@@ -13557,7 +13580,7 @@
           <a:p>
             <a:r>
               <a:rPr lang="en-GB" dirty="0"/>
-              <a:t>The Future</a:t>
+              <a:t>What was this talk about? </a:t>
             </a:r>
           </a:p>
         </p:txBody>
@@ -13910,6 +13933,253 @@
 </file>
 
 <file path=ppt/slides/slide16.xml><?xml version="1.0" encoding="utf-8"?>
+<p:sld xmlns:a="http://schemas.openxmlformats.org/drawingml/2006/main" xmlns:r="http://schemas.openxmlformats.org/officeDocument/2006/relationships" xmlns:p="http://schemas.openxmlformats.org/presentationml/2006/main">
+  <p:cSld>
+    <p:spTree>
+      <p:nvGrpSpPr>
+        <p:cNvPr id="1" name=""/>
+        <p:cNvGrpSpPr/>
+        <p:nvPr/>
+      </p:nvGrpSpPr>
+      <p:grpSpPr>
+        <a:xfrm>
+          <a:off x="0" y="0"/>
+          <a:ext cx="0" cy="0"/>
+          <a:chOff x="0" y="0"/>
+          <a:chExt cx="0" cy="0"/>
+        </a:xfrm>
+      </p:grpSpPr>
+      <p:sp>
+        <p:nvSpPr>
+          <p:cNvPr id="2" name="Title 1">
+            <a:extLst>
+              <a:ext uri="{FF2B5EF4-FFF2-40B4-BE49-F238E27FC236}">
+                <a16:creationId xmlns:a16="http://schemas.microsoft.com/office/drawing/2014/main" id="{64D2BC57-BB6F-4DBE-9818-ABC62694C631}"/>
+              </a:ext>
+            </a:extLst>
+          </p:cNvPr>
+          <p:cNvSpPr>
+            <a:spLocks noGrp="1"/>
+          </p:cNvSpPr>
+          <p:nvPr>
+            <p:ph type="title"/>
+          </p:nvPr>
+        </p:nvSpPr>
+        <p:spPr/>
+        <p:txBody>
+          <a:bodyPr/>
+          <a:lstStyle/>
+          <a:p>
+            <a:r>
+              <a:rPr lang="en-GB" dirty="0"/>
+              <a:t>The </a:t>
+            </a:r>
+            <a:r>
+              <a:rPr lang="en-GB" dirty="0" err="1"/>
+              <a:t>StronG</a:t>
+            </a:r>
+            <a:r>
+              <a:rPr lang="en-GB" dirty="0"/>
+              <a:t> Points</a:t>
+            </a:r>
+          </a:p>
+        </p:txBody>
+      </p:sp>
+      <p:sp>
+        <p:nvSpPr>
+          <p:cNvPr id="3" name="Text Placeholder 2">
+            <a:extLst>
+              <a:ext uri="{FF2B5EF4-FFF2-40B4-BE49-F238E27FC236}">
+                <a16:creationId xmlns:a16="http://schemas.microsoft.com/office/drawing/2014/main" id="{AFBD2C7E-7036-4431-8081-4F44E68251E1}"/>
+              </a:ext>
+            </a:extLst>
+          </p:cNvPr>
+          <p:cNvSpPr>
+            <a:spLocks noGrp="1"/>
+          </p:cNvSpPr>
+          <p:nvPr>
+            <p:ph type="body" idx="1"/>
+          </p:nvPr>
+        </p:nvSpPr>
+        <p:spPr/>
+        <p:txBody>
+          <a:bodyPr/>
+          <a:lstStyle/>
+          <a:p>
+            <a:r>
+              <a:rPr lang="en-GB" dirty="0"/>
+              <a:t>Document DB</a:t>
+            </a:r>
+          </a:p>
+        </p:txBody>
+      </p:sp>
+      <p:sp>
+        <p:nvSpPr>
+          <p:cNvPr id="4" name="Content Placeholder 3">
+            <a:extLst>
+              <a:ext uri="{FF2B5EF4-FFF2-40B4-BE49-F238E27FC236}">
+                <a16:creationId xmlns:a16="http://schemas.microsoft.com/office/drawing/2014/main" id="{03AEB919-F024-43D4-BF7F-707A942C3B7D}"/>
+              </a:ext>
+            </a:extLst>
+          </p:cNvPr>
+          <p:cNvSpPr>
+            <a:spLocks noGrp="1"/>
+          </p:cNvSpPr>
+          <p:nvPr>
+            <p:ph sz="half" idx="2"/>
+          </p:nvPr>
+        </p:nvSpPr>
+        <p:spPr/>
+        <p:txBody>
+          <a:bodyPr>
+            <a:normAutofit fontScale="85000" lnSpcReduction="20000"/>
+          </a:bodyPr>
+          <a:lstStyle/>
+          <a:p>
+            <a:r>
+              <a:rPr lang="en-GB" dirty="0"/>
+              <a:t>Semi structured data</a:t>
+            </a:r>
+          </a:p>
+          <a:p>
+            <a:r>
+              <a:rPr lang="en-GB" dirty="0"/>
+              <a:t>No explicitly defined schemas</a:t>
+            </a:r>
+          </a:p>
+          <a:p>
+            <a:r>
+              <a:rPr lang="en-GB" dirty="0"/>
+              <a:t>Large volumes of data</a:t>
+            </a:r>
+          </a:p>
+          <a:p>
+            <a:r>
+              <a:rPr lang="en-GB" dirty="0"/>
+              <a:t>Low latency</a:t>
+            </a:r>
+          </a:p>
+          <a:p>
+            <a:r>
+              <a:rPr lang="en-GB" dirty="0"/>
+              <a:t>High scalability</a:t>
+            </a:r>
+          </a:p>
+          <a:p>
+            <a:r>
+              <a:rPr lang="en-GB" dirty="0"/>
+              <a:t>Limited ORIM</a:t>
+            </a:r>
+          </a:p>
+          <a:p>
+            <a:endParaRPr lang="en-GB" dirty="0"/>
+          </a:p>
+        </p:txBody>
+      </p:sp>
+      <p:sp>
+        <p:nvSpPr>
+          <p:cNvPr id="5" name="Text Placeholder 4">
+            <a:extLst>
+              <a:ext uri="{FF2B5EF4-FFF2-40B4-BE49-F238E27FC236}">
+                <a16:creationId xmlns:a16="http://schemas.microsoft.com/office/drawing/2014/main" id="{1EBB71B2-98B4-43FE-9F11-F7E52D3E9F4A}"/>
+              </a:ext>
+            </a:extLst>
+          </p:cNvPr>
+          <p:cNvSpPr>
+            <a:spLocks noGrp="1"/>
+          </p:cNvSpPr>
+          <p:nvPr>
+            <p:ph type="body" sz="quarter" idx="3"/>
+          </p:nvPr>
+        </p:nvSpPr>
+        <p:spPr/>
+        <p:txBody>
+          <a:bodyPr/>
+          <a:lstStyle/>
+          <a:p>
+            <a:r>
+              <a:rPr lang="en-GB" dirty="0"/>
+              <a:t>SQL</a:t>
+            </a:r>
+          </a:p>
+        </p:txBody>
+      </p:sp>
+      <p:sp>
+        <p:nvSpPr>
+          <p:cNvPr id="6" name="Content Placeholder 5">
+            <a:extLst>
+              <a:ext uri="{FF2B5EF4-FFF2-40B4-BE49-F238E27FC236}">
+                <a16:creationId xmlns:a16="http://schemas.microsoft.com/office/drawing/2014/main" id="{7ED43642-1642-4EFC-90EE-55BB0764EC54}"/>
+              </a:ext>
+            </a:extLst>
+          </p:cNvPr>
+          <p:cNvSpPr>
+            <a:spLocks noGrp="1"/>
+          </p:cNvSpPr>
+          <p:nvPr>
+            <p:ph sz="quarter" idx="4"/>
+          </p:nvPr>
+        </p:nvSpPr>
+        <p:spPr/>
+        <p:txBody>
+          <a:bodyPr>
+            <a:normAutofit fontScale="85000" lnSpcReduction="20000"/>
+          </a:bodyPr>
+          <a:lstStyle/>
+          <a:p>
+            <a:r>
+              <a:rPr lang="en-GB" dirty="0"/>
+              <a:t>ACID </a:t>
+            </a:r>
+          </a:p>
+          <a:p>
+            <a:r>
+              <a:rPr lang="en-GB" dirty="0"/>
+              <a:t>Normalized data structures</a:t>
+            </a:r>
+          </a:p>
+          <a:p>
+            <a:r>
+              <a:rPr lang="en-GB" dirty="0"/>
+              <a:t>Joins</a:t>
+            </a:r>
+          </a:p>
+          <a:p>
+            <a:r>
+              <a:rPr lang="en-GB" dirty="0"/>
+              <a:t>Reporting queries (WHERE)</a:t>
+            </a:r>
+          </a:p>
+          <a:p>
+            <a:pPr lvl="1"/>
+            <a:r>
+              <a:rPr lang="en-GB" dirty="0"/>
+              <a:t>Ad hoc queries</a:t>
+            </a:r>
+          </a:p>
+          <a:p>
+            <a:pPr lvl="1"/>
+            <a:r>
+              <a:rPr lang="en-GB" dirty="0"/>
+              <a:t>Ad hoc aggregation of data</a:t>
+            </a:r>
+          </a:p>
+        </p:txBody>
+      </p:sp>
+    </p:spTree>
+    <p:extLst>
+      <p:ext uri="{BB962C8B-B14F-4D97-AF65-F5344CB8AC3E}">
+        <p14:creationId xmlns:p14="http://schemas.microsoft.com/office/powerpoint/2010/main" val="4006683996"/>
+      </p:ext>
+    </p:extLst>
+  </p:cSld>
+  <p:clrMapOvr>
+    <a:masterClrMapping/>
+  </p:clrMapOvr>
+</p:sld>
+</file>
+
+<file path=ppt/slides/slide17.xml><?xml version="1.0" encoding="utf-8"?>
 <p:sld xmlns:a="http://schemas.openxmlformats.org/drawingml/2006/main" xmlns:r="http://schemas.openxmlformats.org/officeDocument/2006/relationships" xmlns:p="http://schemas.openxmlformats.org/presentationml/2006/main">
   <p:cSld>
     <p:spTree>

</xml_diff>